<commit_message>
Added more content to filters.md
</commit_message>
<xml_diff>
--- a/filter_design/pictures/picturespptx.pptx
+++ b/filter_design/pictures/picturespptx.pptx
@@ -104,6 +104,11 @@
       </a:defRPr>
     </a:lvl9pPr>
   </p:defaultTextStyle>
+  <p:extLst>
+    <p:ext uri="{EFAFB233-063F-42B5-8137-9DF3F51BA10A}">
+      <p15:sldGuideLst xmlns:p15="http://schemas.microsoft.com/office/powerpoint/2012/main"/>
+    </p:ext>
+  </p:extLst>
 </p:presentation>
 </file>
 
@@ -3342,6 +3347,1214 @@
           <a:chExt cx="0" cy="0"/>
         </a:xfrm>
       </p:grpSpPr>
+      <p:grpSp>
+        <p:nvGrpSpPr>
+          <p:cNvPr id="30" name="Group 29">
+            <a:extLst>
+              <a:ext uri="{FF2B5EF4-FFF2-40B4-BE49-F238E27FC236}">
+                <a16:creationId xmlns:a16="http://schemas.microsoft.com/office/drawing/2014/main" id="{8E90B20C-93E9-6ABD-F6ED-ECD3C4D879CE}"/>
+              </a:ext>
+            </a:extLst>
+          </p:cNvPr>
+          <p:cNvGrpSpPr/>
+          <p:nvPr/>
+        </p:nvGrpSpPr>
+        <p:grpSpPr>
+          <a:xfrm>
+            <a:off x="2618329" y="1400671"/>
+            <a:ext cx="3297808" cy="2514435"/>
+            <a:chOff x="2618329" y="1400671"/>
+            <a:chExt cx="3297808" cy="2514435"/>
+          </a:xfrm>
+        </p:grpSpPr>
+        <p:sp>
+          <p:nvSpPr>
+            <p:cNvPr id="2" name="Oval 1">
+              <a:extLst>
+                <a:ext uri="{FF2B5EF4-FFF2-40B4-BE49-F238E27FC236}">
+                  <a16:creationId xmlns:a16="http://schemas.microsoft.com/office/drawing/2014/main" id="{BECFC383-084B-DAC7-5B25-2DD74E668400}"/>
+                </a:ext>
+              </a:extLst>
+            </p:cNvPr>
+            <p:cNvSpPr/>
+            <p:nvPr/>
+          </p:nvSpPr>
+          <p:spPr>
+            <a:xfrm>
+              <a:off x="3053255" y="1973317"/>
+              <a:ext cx="1818290" cy="1818290"/>
+            </a:xfrm>
+            <a:prstGeom prst="ellipse">
+              <a:avLst/>
+            </a:prstGeom>
+            <a:noFill/>
+          </p:spPr>
+          <p:style>
+            <a:lnRef idx="2">
+              <a:schemeClr val="accent1">
+                <a:shade val="15000"/>
+              </a:schemeClr>
+            </a:lnRef>
+            <a:fillRef idx="1">
+              <a:schemeClr val="accent1"/>
+            </a:fillRef>
+            <a:effectRef idx="0">
+              <a:schemeClr val="accent1"/>
+            </a:effectRef>
+            <a:fontRef idx="minor">
+              <a:schemeClr val="lt1"/>
+            </a:fontRef>
+          </p:style>
+          <p:txBody>
+            <a:bodyPr rtlCol="0" anchor="ctr"/>
+            <a:lstStyle/>
+            <a:p>
+              <a:pPr algn="ctr"/>
+              <a:endParaRPr lang="en-US" sz="2400">
+                <a:noFill/>
+              </a:endParaRPr>
+            </a:p>
+          </p:txBody>
+        </p:sp>
+        <p:cxnSp>
+          <p:nvCxnSpPr>
+            <p:cNvPr id="4" name="Straight Connector 3">
+              <a:extLst>
+                <a:ext uri="{FF2B5EF4-FFF2-40B4-BE49-F238E27FC236}">
+                  <a16:creationId xmlns:a16="http://schemas.microsoft.com/office/drawing/2014/main" id="{4E0D07C0-C8D5-FEC0-D54A-51B7DC8D6826}"/>
+                </a:ext>
+              </a:extLst>
+            </p:cNvPr>
+            <p:cNvCxnSpPr>
+              <a:cxnSpLocks/>
+            </p:cNvCxnSpPr>
+            <p:nvPr/>
+          </p:nvCxnSpPr>
+          <p:spPr>
+            <a:xfrm>
+              <a:off x="3962400" y="1777205"/>
+              <a:ext cx="0" cy="2137901"/>
+            </a:xfrm>
+            <a:prstGeom prst="line">
+              <a:avLst/>
+            </a:prstGeom>
+            <a:ln>
+              <a:prstDash val="sysDot"/>
+            </a:ln>
+          </p:spPr>
+          <p:style>
+            <a:lnRef idx="2">
+              <a:schemeClr val="accent1"/>
+            </a:lnRef>
+            <a:fillRef idx="0">
+              <a:schemeClr val="accent1"/>
+            </a:fillRef>
+            <a:effectRef idx="1">
+              <a:schemeClr val="accent1"/>
+            </a:effectRef>
+            <a:fontRef idx="minor">
+              <a:schemeClr val="tx1"/>
+            </a:fontRef>
+          </p:style>
+        </p:cxnSp>
+        <p:cxnSp>
+          <p:nvCxnSpPr>
+            <p:cNvPr id="5" name="Straight Connector 4">
+              <a:extLst>
+                <a:ext uri="{FF2B5EF4-FFF2-40B4-BE49-F238E27FC236}">
+                  <a16:creationId xmlns:a16="http://schemas.microsoft.com/office/drawing/2014/main" id="{93C3058D-1081-6F56-7DE5-AB053C718F88}"/>
+                </a:ext>
+              </a:extLst>
+            </p:cNvPr>
+            <p:cNvCxnSpPr>
+              <a:cxnSpLocks/>
+            </p:cNvCxnSpPr>
+            <p:nvPr/>
+          </p:nvCxnSpPr>
+          <p:spPr>
+            <a:xfrm>
+              <a:off x="2756338" y="2882462"/>
+              <a:ext cx="2412124" cy="0"/>
+            </a:xfrm>
+            <a:prstGeom prst="line">
+              <a:avLst/>
+            </a:prstGeom>
+            <a:ln>
+              <a:prstDash val="sysDot"/>
+            </a:ln>
+          </p:spPr>
+          <p:style>
+            <a:lnRef idx="2">
+              <a:schemeClr val="accent1"/>
+            </a:lnRef>
+            <a:fillRef idx="0">
+              <a:schemeClr val="accent1"/>
+            </a:fillRef>
+            <a:effectRef idx="1">
+              <a:schemeClr val="accent1"/>
+            </a:effectRef>
+            <a:fontRef idx="minor">
+              <a:schemeClr val="tx1"/>
+            </a:fontRef>
+          </p:style>
+        </p:cxnSp>
+        <p:sp>
+          <p:nvSpPr>
+            <p:cNvPr id="7" name="TextBox 6">
+              <a:extLst>
+                <a:ext uri="{FF2B5EF4-FFF2-40B4-BE49-F238E27FC236}">
+                  <a16:creationId xmlns:a16="http://schemas.microsoft.com/office/drawing/2014/main" id="{99BA2CB8-F4D1-755D-DA0C-F1375EAE9F6D}"/>
+                </a:ext>
+              </a:extLst>
+            </p:cNvPr>
+            <p:cNvSpPr txBox="1"/>
+            <p:nvPr/>
+          </p:nvSpPr>
+          <p:spPr>
+            <a:xfrm>
+              <a:off x="4715559" y="2627348"/>
+              <a:ext cx="320922" cy="461665"/>
+            </a:xfrm>
+            <a:prstGeom prst="rect">
+              <a:avLst/>
+            </a:prstGeom>
+            <a:noFill/>
+          </p:spPr>
+          <p:txBody>
+            <a:bodyPr wrap="none" rtlCol="0">
+              <a:spAutoFit/>
+            </a:bodyPr>
+            <a:lstStyle/>
+            <a:p>
+              <a:r>
+                <a:rPr lang="en-US" sz="2400" dirty="0"/>
+                <a:t>x</a:t>
+              </a:r>
+            </a:p>
+          </p:txBody>
+        </p:sp>
+        <p:sp>
+          <p:nvSpPr>
+            <p:cNvPr id="8" name="TextBox 7">
+              <a:extLst>
+                <a:ext uri="{FF2B5EF4-FFF2-40B4-BE49-F238E27FC236}">
+                  <a16:creationId xmlns:a16="http://schemas.microsoft.com/office/drawing/2014/main" id="{C40800E1-573C-361E-BFAA-88CBEBECE2BE}"/>
+                </a:ext>
+              </a:extLst>
+            </p:cNvPr>
+            <p:cNvSpPr txBox="1"/>
+            <p:nvPr/>
+          </p:nvSpPr>
+          <p:spPr>
+            <a:xfrm>
+              <a:off x="2909626" y="2637858"/>
+              <a:ext cx="320922" cy="461665"/>
+            </a:xfrm>
+            <a:prstGeom prst="rect">
+              <a:avLst/>
+            </a:prstGeom>
+            <a:noFill/>
+          </p:spPr>
+          <p:txBody>
+            <a:bodyPr wrap="none" rtlCol="0">
+              <a:spAutoFit/>
+            </a:bodyPr>
+            <a:lstStyle/>
+            <a:p>
+              <a:r>
+                <a:rPr lang="en-US" sz="2400" dirty="0"/>
+                <a:t>x</a:t>
+              </a:r>
+            </a:p>
+          </p:txBody>
+        </p:sp>
+        <p:cxnSp>
+          <p:nvCxnSpPr>
+            <p:cNvPr id="10" name="Straight Connector 9">
+              <a:extLst>
+                <a:ext uri="{FF2B5EF4-FFF2-40B4-BE49-F238E27FC236}">
+                  <a16:creationId xmlns:a16="http://schemas.microsoft.com/office/drawing/2014/main" id="{9102AA71-3DE1-7AB7-AA0D-2E11D369535F}"/>
+                </a:ext>
+              </a:extLst>
+            </p:cNvPr>
+            <p:cNvCxnSpPr>
+              <a:cxnSpLocks/>
+            </p:cNvCxnSpPr>
+            <p:nvPr/>
+          </p:nvCxnSpPr>
+          <p:spPr>
+            <a:xfrm>
+              <a:off x="3438639" y="1945150"/>
+              <a:ext cx="988843" cy="1762742"/>
+            </a:xfrm>
+            <a:prstGeom prst="line">
+              <a:avLst/>
+            </a:prstGeom>
+            <a:ln>
+              <a:solidFill>
+                <a:srgbClr val="C00000"/>
+              </a:solidFill>
+              <a:prstDash val="sysDash"/>
+            </a:ln>
+          </p:spPr>
+          <p:style>
+            <a:lnRef idx="2">
+              <a:schemeClr val="accent1"/>
+            </a:lnRef>
+            <a:fillRef idx="0">
+              <a:schemeClr val="accent1"/>
+            </a:fillRef>
+            <a:effectRef idx="1">
+              <a:schemeClr val="accent1"/>
+            </a:effectRef>
+            <a:fontRef idx="minor">
+              <a:schemeClr val="tx1"/>
+            </a:fontRef>
+          </p:style>
+        </p:cxnSp>
+        <p:sp>
+          <p:nvSpPr>
+            <p:cNvPr id="12" name="TextBox 11">
+              <a:extLst>
+                <a:ext uri="{FF2B5EF4-FFF2-40B4-BE49-F238E27FC236}">
+                  <a16:creationId xmlns:a16="http://schemas.microsoft.com/office/drawing/2014/main" id="{FD6406C2-66F8-64D0-6830-B2CDB4471141}"/>
+                </a:ext>
+              </a:extLst>
+            </p:cNvPr>
+            <p:cNvSpPr txBox="1"/>
+            <p:nvPr/>
+          </p:nvSpPr>
+          <p:spPr>
+            <a:xfrm>
+              <a:off x="3362352" y="1839125"/>
+              <a:ext cx="320922" cy="461665"/>
+            </a:xfrm>
+            <a:prstGeom prst="rect">
+              <a:avLst/>
+            </a:prstGeom>
+            <a:noFill/>
+          </p:spPr>
+          <p:txBody>
+            <a:bodyPr wrap="none" rtlCol="0">
+              <a:spAutoFit/>
+            </a:bodyPr>
+            <a:lstStyle/>
+            <a:p>
+              <a:r>
+                <a:rPr lang="en-US" sz="2400" dirty="0"/>
+                <a:t>x</a:t>
+              </a:r>
+            </a:p>
+          </p:txBody>
+        </p:sp>
+        <p:sp>
+          <p:nvSpPr>
+            <p:cNvPr id="14" name="TextBox 13">
+              <a:extLst>
+                <a:ext uri="{FF2B5EF4-FFF2-40B4-BE49-F238E27FC236}">
+                  <a16:creationId xmlns:a16="http://schemas.microsoft.com/office/drawing/2014/main" id="{22EBFA8A-9B3D-7006-1971-C879F7A73137}"/>
+                </a:ext>
+              </a:extLst>
+            </p:cNvPr>
+            <p:cNvSpPr txBox="1"/>
+            <p:nvPr/>
+          </p:nvSpPr>
+          <p:spPr>
+            <a:xfrm>
+              <a:off x="4255390" y="3427970"/>
+              <a:ext cx="320922" cy="461665"/>
+            </a:xfrm>
+            <a:prstGeom prst="rect">
+              <a:avLst/>
+            </a:prstGeom>
+            <a:noFill/>
+          </p:spPr>
+          <p:txBody>
+            <a:bodyPr wrap="none" rtlCol="0">
+              <a:spAutoFit/>
+            </a:bodyPr>
+            <a:lstStyle/>
+            <a:p>
+              <a:r>
+                <a:rPr lang="en-US" sz="2400" dirty="0"/>
+                <a:t>x</a:t>
+              </a:r>
+            </a:p>
+          </p:txBody>
+        </p:sp>
+        <p:cxnSp>
+          <p:nvCxnSpPr>
+            <p:cNvPr id="15" name="Straight Connector 14">
+              <a:extLst>
+                <a:ext uri="{FF2B5EF4-FFF2-40B4-BE49-F238E27FC236}">
+                  <a16:creationId xmlns:a16="http://schemas.microsoft.com/office/drawing/2014/main" id="{EFDD353A-E510-AC0F-9A4B-FB788C20856A}"/>
+                </a:ext>
+              </a:extLst>
+            </p:cNvPr>
+            <p:cNvCxnSpPr>
+              <a:cxnSpLocks/>
+            </p:cNvCxnSpPr>
+            <p:nvPr/>
+          </p:nvCxnSpPr>
+          <p:spPr>
+            <a:xfrm flipV="1">
+              <a:off x="3444030" y="2028865"/>
+              <a:ext cx="988843" cy="1762742"/>
+            </a:xfrm>
+            <a:prstGeom prst="line">
+              <a:avLst/>
+            </a:prstGeom>
+            <a:ln>
+              <a:solidFill>
+                <a:srgbClr val="C00000"/>
+              </a:solidFill>
+              <a:prstDash val="sysDash"/>
+            </a:ln>
+          </p:spPr>
+          <p:style>
+            <a:lnRef idx="2">
+              <a:schemeClr val="accent1"/>
+            </a:lnRef>
+            <a:fillRef idx="0">
+              <a:schemeClr val="accent1"/>
+            </a:fillRef>
+            <a:effectRef idx="1">
+              <a:schemeClr val="accent1"/>
+            </a:effectRef>
+            <a:fontRef idx="minor">
+              <a:schemeClr val="tx1"/>
+            </a:fontRef>
+          </p:style>
+        </p:cxnSp>
+        <p:sp>
+          <p:nvSpPr>
+            <p:cNvPr id="16" name="TextBox 15">
+              <a:extLst>
+                <a:ext uri="{FF2B5EF4-FFF2-40B4-BE49-F238E27FC236}">
+                  <a16:creationId xmlns:a16="http://schemas.microsoft.com/office/drawing/2014/main" id="{837B61D8-195F-9E22-4927-E4627E9211A7}"/>
+                </a:ext>
+              </a:extLst>
+            </p:cNvPr>
+            <p:cNvSpPr txBox="1"/>
+            <p:nvPr/>
+          </p:nvSpPr>
+          <p:spPr>
+            <a:xfrm>
+              <a:off x="4229170" y="1826200"/>
+              <a:ext cx="320922" cy="461665"/>
+            </a:xfrm>
+            <a:prstGeom prst="rect">
+              <a:avLst/>
+            </a:prstGeom>
+            <a:noFill/>
+          </p:spPr>
+          <p:txBody>
+            <a:bodyPr wrap="none" rtlCol="0">
+              <a:spAutoFit/>
+            </a:bodyPr>
+            <a:lstStyle/>
+            <a:p>
+              <a:r>
+                <a:rPr lang="en-US" sz="2400" dirty="0"/>
+                <a:t>x</a:t>
+              </a:r>
+            </a:p>
+          </p:txBody>
+        </p:sp>
+        <p:sp>
+          <p:nvSpPr>
+            <p:cNvPr id="17" name="TextBox 16">
+              <a:extLst>
+                <a:ext uri="{FF2B5EF4-FFF2-40B4-BE49-F238E27FC236}">
+                  <a16:creationId xmlns:a16="http://schemas.microsoft.com/office/drawing/2014/main" id="{5478B9A3-03F7-CB58-D229-A8046E884F2E}"/>
+                </a:ext>
+              </a:extLst>
+            </p:cNvPr>
+            <p:cNvSpPr txBox="1"/>
+            <p:nvPr/>
+          </p:nvSpPr>
+          <p:spPr>
+            <a:xfrm>
+              <a:off x="3346435" y="3421992"/>
+              <a:ext cx="320922" cy="461665"/>
+            </a:xfrm>
+            <a:prstGeom prst="rect">
+              <a:avLst/>
+            </a:prstGeom>
+            <a:noFill/>
+          </p:spPr>
+          <p:txBody>
+            <a:bodyPr wrap="none" rtlCol="0">
+              <a:spAutoFit/>
+            </a:bodyPr>
+            <a:lstStyle/>
+            <a:p>
+              <a:r>
+                <a:rPr lang="en-US" sz="2400" dirty="0"/>
+                <a:t>x</a:t>
+              </a:r>
+            </a:p>
+          </p:txBody>
+        </p:sp>
+        <mc:AlternateContent xmlns:mc="http://schemas.openxmlformats.org/markup-compatibility/2006">
+          <mc:Choice xmlns:a14="http://schemas.microsoft.com/office/drawing/2010/main" Requires="a14">
+            <p:sp>
+              <p:nvSpPr>
+                <p:cNvPr id="18" name="TextBox 17">
+                  <a:extLst>
+                    <a:ext uri="{FF2B5EF4-FFF2-40B4-BE49-F238E27FC236}">
+                      <a16:creationId xmlns:a16="http://schemas.microsoft.com/office/drawing/2014/main" id="{0AEA6B01-9D28-4F9E-02E8-B64F54EFC3FA}"/>
+                    </a:ext>
+                  </a:extLst>
+                </p:cNvPr>
+                <p:cNvSpPr txBox="1"/>
+                <p:nvPr/>
+              </p:nvSpPr>
+              <p:spPr>
+                <a:xfrm>
+                  <a:off x="4871545" y="2570116"/>
+                  <a:ext cx="434926" cy="369332"/>
+                </a:xfrm>
+                <a:prstGeom prst="rect">
+                  <a:avLst/>
+                </a:prstGeom>
+                <a:noFill/>
+              </p:spPr>
+              <p:txBody>
+                <a:bodyPr wrap="none" rtlCol="0">
+                  <a:spAutoFit/>
+                </a:bodyPr>
+                <a:lstStyle/>
+                <a:p>
+                  <a14:m>
+                    <m:oMathPara xmlns:m="http://schemas.openxmlformats.org/officeDocument/2006/math">
+                      <m:oMathParaPr>
+                        <m:jc m:val="centerGroup"/>
+                      </m:oMathParaPr>
+                      <m:oMath xmlns:m="http://schemas.openxmlformats.org/officeDocument/2006/math">
+                        <m:sSub>
+                          <m:sSubPr>
+                            <m:ctrlPr>
+                              <a:rPr lang="en-GB" b="0" i="1" smtClean="0">
+                                <a:latin typeface="Cambria Math" panose="02040503050406030204" pitchFamily="18" charset="0"/>
+                              </a:rPr>
+                            </m:ctrlPr>
+                          </m:sSubPr>
+                          <m:e>
+                            <m:r>
+                              <a:rPr lang="en-GB" b="0" i="1" smtClean="0">
+                                <a:latin typeface="Cambria Math" panose="02040503050406030204" pitchFamily="18" charset="0"/>
+                              </a:rPr>
+                              <m:t>𝑠</m:t>
+                            </m:r>
+                          </m:e>
+                          <m:sub>
+                            <m:r>
+                              <a:rPr lang="en-GB" b="0" i="1" smtClean="0">
+                                <a:latin typeface="Cambria Math" panose="02040503050406030204" pitchFamily="18" charset="0"/>
+                              </a:rPr>
+                              <m:t>1</m:t>
+                            </m:r>
+                          </m:sub>
+                        </m:sSub>
+                      </m:oMath>
+                    </m:oMathPara>
+                  </a14:m>
+                  <a:endParaRPr lang="en-GB" b="0" dirty="0"/>
+                </a:p>
+              </p:txBody>
+            </p:sp>
+          </mc:Choice>
+          <mc:Fallback>
+            <p:sp>
+              <p:nvSpPr>
+                <p:cNvPr id="18" name="TextBox 17">
+                  <a:extLst>
+                    <a:ext uri="{FF2B5EF4-FFF2-40B4-BE49-F238E27FC236}">
+                      <a16:creationId xmlns:a16="http://schemas.microsoft.com/office/drawing/2014/main" id="{0AEA6B01-9D28-4F9E-02E8-B64F54EFC3FA}"/>
+                    </a:ext>
+                  </a:extLst>
+                </p:cNvPr>
+                <p:cNvSpPr txBox="1">
+                  <a:spLocks noRot="1" noChangeAspect="1" noMove="1" noResize="1" noEditPoints="1" noAdjustHandles="1" noChangeArrowheads="1" noChangeShapeType="1" noTextEdit="1"/>
+                </p:cNvSpPr>
+                <p:nvPr/>
+              </p:nvSpPr>
+              <p:spPr>
+                <a:xfrm>
+                  <a:off x="4871545" y="2570116"/>
+                  <a:ext cx="434926" cy="369332"/>
+                </a:xfrm>
+                <a:prstGeom prst="rect">
+                  <a:avLst/>
+                </a:prstGeom>
+                <a:blipFill>
+                  <a:blip r:embed="rId2"/>
+                  <a:stretch>
+                    <a:fillRect/>
+                  </a:stretch>
+                </a:blipFill>
+              </p:spPr>
+              <p:txBody>
+                <a:bodyPr/>
+                <a:lstStyle/>
+                <a:p>
+                  <a:r>
+                    <a:rPr lang="en-US">
+                      <a:noFill/>
+                    </a:rPr>
+                    <a:t> </a:t>
+                  </a:r>
+                </a:p>
+              </p:txBody>
+            </p:sp>
+          </mc:Fallback>
+        </mc:AlternateContent>
+        <mc:AlternateContent xmlns:mc="http://schemas.openxmlformats.org/markup-compatibility/2006">
+          <mc:Choice xmlns:a14="http://schemas.microsoft.com/office/drawing/2010/main" Requires="a14">
+            <p:sp>
+              <p:nvSpPr>
+                <p:cNvPr id="21" name="TextBox 20">
+                  <a:extLst>
+                    <a:ext uri="{FF2B5EF4-FFF2-40B4-BE49-F238E27FC236}">
+                      <a16:creationId xmlns:a16="http://schemas.microsoft.com/office/drawing/2014/main" id="{1AB29584-2CD4-0E82-C783-CF37FD95E310}"/>
+                    </a:ext>
+                  </a:extLst>
+                </p:cNvPr>
+                <p:cNvSpPr txBox="1"/>
+                <p:nvPr/>
+              </p:nvSpPr>
+              <p:spPr>
+                <a:xfrm>
+                  <a:off x="4389631" y="3545774"/>
+                  <a:ext cx="440249" cy="369332"/>
+                </a:xfrm>
+                <a:prstGeom prst="rect">
+                  <a:avLst/>
+                </a:prstGeom>
+                <a:noFill/>
+              </p:spPr>
+              <p:txBody>
+                <a:bodyPr wrap="none" rtlCol="0">
+                  <a:spAutoFit/>
+                </a:bodyPr>
+                <a:lstStyle/>
+                <a:p>
+                  <a14:m>
+                    <m:oMathPara xmlns:m="http://schemas.openxmlformats.org/officeDocument/2006/math">
+                      <m:oMathParaPr>
+                        <m:jc m:val="centerGroup"/>
+                      </m:oMathParaPr>
+                      <m:oMath xmlns:m="http://schemas.openxmlformats.org/officeDocument/2006/math">
+                        <m:sSub>
+                          <m:sSubPr>
+                            <m:ctrlPr>
+                              <a:rPr lang="en-GB" b="0" i="1" smtClean="0">
+                                <a:latin typeface="Cambria Math" panose="02040503050406030204" pitchFamily="18" charset="0"/>
+                              </a:rPr>
+                            </m:ctrlPr>
+                          </m:sSubPr>
+                          <m:e>
+                            <m:r>
+                              <a:rPr lang="en-GB" b="0" i="1" smtClean="0">
+                                <a:latin typeface="Cambria Math" panose="02040503050406030204" pitchFamily="18" charset="0"/>
+                              </a:rPr>
+                              <m:t>𝑠</m:t>
+                            </m:r>
+                          </m:e>
+                          <m:sub>
+                            <m:r>
+                              <a:rPr lang="en-GB" b="0" i="1" smtClean="0">
+                                <a:latin typeface="Cambria Math" panose="02040503050406030204" pitchFamily="18" charset="0"/>
+                              </a:rPr>
+                              <m:t>6</m:t>
+                            </m:r>
+                          </m:sub>
+                        </m:sSub>
+                      </m:oMath>
+                    </m:oMathPara>
+                  </a14:m>
+                  <a:endParaRPr lang="en-GB" b="0" dirty="0"/>
+                </a:p>
+              </p:txBody>
+            </p:sp>
+          </mc:Choice>
+          <mc:Fallback>
+            <p:sp>
+              <p:nvSpPr>
+                <p:cNvPr id="21" name="TextBox 20">
+                  <a:extLst>
+                    <a:ext uri="{FF2B5EF4-FFF2-40B4-BE49-F238E27FC236}">
+                      <a16:creationId xmlns:a16="http://schemas.microsoft.com/office/drawing/2014/main" id="{1AB29584-2CD4-0E82-C783-CF37FD95E310}"/>
+                    </a:ext>
+                  </a:extLst>
+                </p:cNvPr>
+                <p:cNvSpPr txBox="1">
+                  <a:spLocks noRot="1" noChangeAspect="1" noMove="1" noResize="1" noEditPoints="1" noAdjustHandles="1" noChangeArrowheads="1" noChangeShapeType="1" noTextEdit="1"/>
+                </p:cNvSpPr>
+                <p:nvPr/>
+              </p:nvSpPr>
+              <p:spPr>
+                <a:xfrm>
+                  <a:off x="4389631" y="3545774"/>
+                  <a:ext cx="440249" cy="369332"/>
+                </a:xfrm>
+                <a:prstGeom prst="rect">
+                  <a:avLst/>
+                </a:prstGeom>
+                <a:blipFill>
+                  <a:blip r:embed="rId3"/>
+                  <a:stretch>
+                    <a:fillRect/>
+                  </a:stretch>
+                </a:blipFill>
+              </p:spPr>
+              <p:txBody>
+                <a:bodyPr/>
+                <a:lstStyle/>
+                <a:p>
+                  <a:r>
+                    <a:rPr lang="en-US">
+                      <a:noFill/>
+                    </a:rPr>
+                    <a:t> </a:t>
+                  </a:r>
+                </a:p>
+              </p:txBody>
+            </p:sp>
+          </mc:Fallback>
+        </mc:AlternateContent>
+        <mc:AlternateContent xmlns:mc="http://schemas.openxmlformats.org/markup-compatibility/2006">
+          <mc:Choice xmlns:a14="http://schemas.microsoft.com/office/drawing/2010/main" Requires="a14">
+            <p:sp>
+              <p:nvSpPr>
+                <p:cNvPr id="22" name="TextBox 21">
+                  <a:extLst>
+                    <a:ext uri="{FF2B5EF4-FFF2-40B4-BE49-F238E27FC236}">
+                      <a16:creationId xmlns:a16="http://schemas.microsoft.com/office/drawing/2014/main" id="{352A2FF2-60BE-A600-34F7-1D151D4CCCD9}"/>
+                    </a:ext>
+                  </a:extLst>
+                </p:cNvPr>
+                <p:cNvSpPr txBox="1"/>
+                <p:nvPr/>
+              </p:nvSpPr>
+              <p:spPr>
+                <a:xfrm>
+                  <a:off x="2998398" y="3530805"/>
+                  <a:ext cx="440249" cy="369332"/>
+                </a:xfrm>
+                <a:prstGeom prst="rect">
+                  <a:avLst/>
+                </a:prstGeom>
+                <a:noFill/>
+              </p:spPr>
+              <p:txBody>
+                <a:bodyPr wrap="none" rtlCol="0">
+                  <a:spAutoFit/>
+                </a:bodyPr>
+                <a:lstStyle/>
+                <a:p>
+                  <a14:m>
+                    <m:oMathPara xmlns:m="http://schemas.openxmlformats.org/officeDocument/2006/math">
+                      <m:oMathParaPr>
+                        <m:jc m:val="centerGroup"/>
+                      </m:oMathParaPr>
+                      <m:oMath xmlns:m="http://schemas.openxmlformats.org/officeDocument/2006/math">
+                        <m:sSub>
+                          <m:sSubPr>
+                            <m:ctrlPr>
+                              <a:rPr lang="en-GB" b="0" i="1" smtClean="0">
+                                <a:latin typeface="Cambria Math" panose="02040503050406030204" pitchFamily="18" charset="0"/>
+                              </a:rPr>
+                            </m:ctrlPr>
+                          </m:sSubPr>
+                          <m:e>
+                            <m:r>
+                              <a:rPr lang="en-GB" b="0" i="1" smtClean="0">
+                                <a:latin typeface="Cambria Math" panose="02040503050406030204" pitchFamily="18" charset="0"/>
+                              </a:rPr>
+                              <m:t>𝑠</m:t>
+                            </m:r>
+                          </m:e>
+                          <m:sub>
+                            <m:r>
+                              <a:rPr lang="en-GB" b="0" i="1" smtClean="0">
+                                <a:latin typeface="Cambria Math" panose="02040503050406030204" pitchFamily="18" charset="0"/>
+                              </a:rPr>
+                              <m:t>5</m:t>
+                            </m:r>
+                          </m:sub>
+                        </m:sSub>
+                      </m:oMath>
+                    </m:oMathPara>
+                  </a14:m>
+                  <a:endParaRPr lang="en-GB" b="0" dirty="0"/>
+                </a:p>
+              </p:txBody>
+            </p:sp>
+          </mc:Choice>
+          <mc:Fallback>
+            <p:sp>
+              <p:nvSpPr>
+                <p:cNvPr id="22" name="TextBox 21">
+                  <a:extLst>
+                    <a:ext uri="{FF2B5EF4-FFF2-40B4-BE49-F238E27FC236}">
+                      <a16:creationId xmlns:a16="http://schemas.microsoft.com/office/drawing/2014/main" id="{352A2FF2-60BE-A600-34F7-1D151D4CCCD9}"/>
+                    </a:ext>
+                  </a:extLst>
+                </p:cNvPr>
+                <p:cNvSpPr txBox="1">
+                  <a:spLocks noRot="1" noChangeAspect="1" noMove="1" noResize="1" noEditPoints="1" noAdjustHandles="1" noChangeArrowheads="1" noChangeShapeType="1" noTextEdit="1"/>
+                </p:cNvSpPr>
+                <p:nvPr/>
+              </p:nvSpPr>
+              <p:spPr>
+                <a:xfrm>
+                  <a:off x="2998398" y="3530805"/>
+                  <a:ext cx="440249" cy="369332"/>
+                </a:xfrm>
+                <a:prstGeom prst="rect">
+                  <a:avLst/>
+                </a:prstGeom>
+                <a:blipFill>
+                  <a:blip r:embed="rId4"/>
+                  <a:stretch>
+                    <a:fillRect/>
+                  </a:stretch>
+                </a:blipFill>
+              </p:spPr>
+              <p:txBody>
+                <a:bodyPr/>
+                <a:lstStyle/>
+                <a:p>
+                  <a:r>
+                    <a:rPr lang="en-US">
+                      <a:noFill/>
+                    </a:rPr>
+                    <a:t> </a:t>
+                  </a:r>
+                </a:p>
+              </p:txBody>
+            </p:sp>
+          </mc:Fallback>
+        </mc:AlternateContent>
+        <mc:AlternateContent xmlns:mc="http://schemas.openxmlformats.org/markup-compatibility/2006">
+          <mc:Choice xmlns:a14="http://schemas.microsoft.com/office/drawing/2010/main" Requires="a14">
+            <p:sp>
+              <p:nvSpPr>
+                <p:cNvPr id="23" name="TextBox 22">
+                  <a:extLst>
+                    <a:ext uri="{FF2B5EF4-FFF2-40B4-BE49-F238E27FC236}">
+                      <a16:creationId xmlns:a16="http://schemas.microsoft.com/office/drawing/2014/main" id="{F9A9180C-ACE0-EA68-8E43-6D52045795EE}"/>
+                    </a:ext>
+                  </a:extLst>
+                </p:cNvPr>
+                <p:cNvSpPr txBox="1"/>
+                <p:nvPr/>
+              </p:nvSpPr>
+              <p:spPr>
+                <a:xfrm>
+                  <a:off x="2618329" y="2533202"/>
+                  <a:ext cx="434926" cy="369332"/>
+                </a:xfrm>
+                <a:prstGeom prst="rect">
+                  <a:avLst/>
+                </a:prstGeom>
+                <a:noFill/>
+              </p:spPr>
+              <p:txBody>
+                <a:bodyPr wrap="none" rtlCol="0">
+                  <a:spAutoFit/>
+                </a:bodyPr>
+                <a:lstStyle/>
+                <a:p>
+                  <a14:m>
+                    <m:oMathPara xmlns:m="http://schemas.openxmlformats.org/officeDocument/2006/math">
+                      <m:oMathParaPr>
+                        <m:jc m:val="centerGroup"/>
+                      </m:oMathParaPr>
+                      <m:oMath xmlns:m="http://schemas.openxmlformats.org/officeDocument/2006/math">
+                        <m:sSub>
+                          <m:sSubPr>
+                            <m:ctrlPr>
+                              <a:rPr lang="en-GB" b="0" i="1" smtClean="0">
+                                <a:latin typeface="Cambria Math" panose="02040503050406030204" pitchFamily="18" charset="0"/>
+                              </a:rPr>
+                            </m:ctrlPr>
+                          </m:sSubPr>
+                          <m:e>
+                            <m:r>
+                              <a:rPr lang="en-GB" b="0" i="1" smtClean="0">
+                                <a:latin typeface="Cambria Math" panose="02040503050406030204" pitchFamily="18" charset="0"/>
+                              </a:rPr>
+                              <m:t>𝑠</m:t>
+                            </m:r>
+                          </m:e>
+                          <m:sub>
+                            <m:r>
+                              <a:rPr lang="en-GB" b="0" i="1" smtClean="0">
+                                <a:latin typeface="Cambria Math" panose="02040503050406030204" pitchFamily="18" charset="0"/>
+                              </a:rPr>
+                              <m:t>4</m:t>
+                            </m:r>
+                          </m:sub>
+                        </m:sSub>
+                      </m:oMath>
+                    </m:oMathPara>
+                  </a14:m>
+                  <a:endParaRPr lang="en-GB" b="0" dirty="0"/>
+                </a:p>
+              </p:txBody>
+            </p:sp>
+          </mc:Choice>
+          <mc:Fallback>
+            <p:sp>
+              <p:nvSpPr>
+                <p:cNvPr id="23" name="TextBox 22">
+                  <a:extLst>
+                    <a:ext uri="{FF2B5EF4-FFF2-40B4-BE49-F238E27FC236}">
+                      <a16:creationId xmlns:a16="http://schemas.microsoft.com/office/drawing/2014/main" id="{F9A9180C-ACE0-EA68-8E43-6D52045795EE}"/>
+                    </a:ext>
+                  </a:extLst>
+                </p:cNvPr>
+                <p:cNvSpPr txBox="1">
+                  <a:spLocks noRot="1" noChangeAspect="1" noMove="1" noResize="1" noEditPoints="1" noAdjustHandles="1" noChangeArrowheads="1" noChangeShapeType="1" noTextEdit="1"/>
+                </p:cNvSpPr>
+                <p:nvPr/>
+              </p:nvSpPr>
+              <p:spPr>
+                <a:xfrm>
+                  <a:off x="2618329" y="2533202"/>
+                  <a:ext cx="434926" cy="369332"/>
+                </a:xfrm>
+                <a:prstGeom prst="rect">
+                  <a:avLst/>
+                </a:prstGeom>
+                <a:blipFill>
+                  <a:blip r:embed="rId5"/>
+                  <a:stretch>
+                    <a:fillRect/>
+                  </a:stretch>
+                </a:blipFill>
+              </p:spPr>
+              <p:txBody>
+                <a:bodyPr/>
+                <a:lstStyle/>
+                <a:p>
+                  <a:r>
+                    <a:rPr lang="en-US">
+                      <a:noFill/>
+                    </a:rPr>
+                    <a:t> </a:t>
+                  </a:r>
+                </a:p>
+              </p:txBody>
+            </p:sp>
+          </mc:Fallback>
+        </mc:AlternateContent>
+        <mc:AlternateContent xmlns:mc="http://schemas.openxmlformats.org/markup-compatibility/2006">
+          <mc:Choice xmlns:a14="http://schemas.microsoft.com/office/drawing/2010/main" Requires="a14">
+            <p:sp>
+              <p:nvSpPr>
+                <p:cNvPr id="24" name="TextBox 23">
+                  <a:extLst>
+                    <a:ext uri="{FF2B5EF4-FFF2-40B4-BE49-F238E27FC236}">
+                      <a16:creationId xmlns:a16="http://schemas.microsoft.com/office/drawing/2014/main" id="{99D1FE72-0FEB-4659-32BD-F31FAD29AE7C}"/>
+                    </a:ext>
+                  </a:extLst>
+                </p:cNvPr>
+                <p:cNvSpPr txBox="1"/>
+                <p:nvPr/>
+              </p:nvSpPr>
+              <p:spPr>
+                <a:xfrm>
+                  <a:off x="3092006" y="1793024"/>
+                  <a:ext cx="440249" cy="369332"/>
+                </a:xfrm>
+                <a:prstGeom prst="rect">
+                  <a:avLst/>
+                </a:prstGeom>
+                <a:noFill/>
+              </p:spPr>
+              <p:txBody>
+                <a:bodyPr wrap="none" rtlCol="0">
+                  <a:spAutoFit/>
+                </a:bodyPr>
+                <a:lstStyle/>
+                <a:p>
+                  <a14:m>
+                    <m:oMathPara xmlns:m="http://schemas.openxmlformats.org/officeDocument/2006/math">
+                      <m:oMathParaPr>
+                        <m:jc m:val="centerGroup"/>
+                      </m:oMathParaPr>
+                      <m:oMath xmlns:m="http://schemas.openxmlformats.org/officeDocument/2006/math">
+                        <m:sSub>
+                          <m:sSubPr>
+                            <m:ctrlPr>
+                              <a:rPr lang="en-GB" b="0" i="1" smtClean="0">
+                                <a:latin typeface="Cambria Math" panose="02040503050406030204" pitchFamily="18" charset="0"/>
+                              </a:rPr>
+                            </m:ctrlPr>
+                          </m:sSubPr>
+                          <m:e>
+                            <m:r>
+                              <a:rPr lang="en-GB" b="0" i="1" smtClean="0">
+                                <a:latin typeface="Cambria Math" panose="02040503050406030204" pitchFamily="18" charset="0"/>
+                              </a:rPr>
+                              <m:t>𝑠</m:t>
+                            </m:r>
+                          </m:e>
+                          <m:sub>
+                            <m:r>
+                              <a:rPr lang="en-GB" b="0" i="1" smtClean="0">
+                                <a:latin typeface="Cambria Math" panose="02040503050406030204" pitchFamily="18" charset="0"/>
+                              </a:rPr>
+                              <m:t>3</m:t>
+                            </m:r>
+                          </m:sub>
+                        </m:sSub>
+                      </m:oMath>
+                    </m:oMathPara>
+                  </a14:m>
+                  <a:endParaRPr lang="en-GB" b="0" dirty="0"/>
+                </a:p>
+              </p:txBody>
+            </p:sp>
+          </mc:Choice>
+          <mc:Fallback>
+            <p:sp>
+              <p:nvSpPr>
+                <p:cNvPr id="24" name="TextBox 23">
+                  <a:extLst>
+                    <a:ext uri="{FF2B5EF4-FFF2-40B4-BE49-F238E27FC236}">
+                      <a16:creationId xmlns:a16="http://schemas.microsoft.com/office/drawing/2014/main" id="{99D1FE72-0FEB-4659-32BD-F31FAD29AE7C}"/>
+                    </a:ext>
+                  </a:extLst>
+                </p:cNvPr>
+                <p:cNvSpPr txBox="1">
+                  <a:spLocks noRot="1" noChangeAspect="1" noMove="1" noResize="1" noEditPoints="1" noAdjustHandles="1" noChangeArrowheads="1" noChangeShapeType="1" noTextEdit="1"/>
+                </p:cNvSpPr>
+                <p:nvPr/>
+              </p:nvSpPr>
+              <p:spPr>
+                <a:xfrm>
+                  <a:off x="3092006" y="1793024"/>
+                  <a:ext cx="440249" cy="369332"/>
+                </a:xfrm>
+                <a:prstGeom prst="rect">
+                  <a:avLst/>
+                </a:prstGeom>
+                <a:blipFill>
+                  <a:blip r:embed="rId6"/>
+                  <a:stretch>
+                    <a:fillRect/>
+                  </a:stretch>
+                </a:blipFill>
+              </p:spPr>
+              <p:txBody>
+                <a:bodyPr/>
+                <a:lstStyle/>
+                <a:p>
+                  <a:r>
+                    <a:rPr lang="en-US">
+                      <a:noFill/>
+                    </a:rPr>
+                    <a:t> </a:t>
+                  </a:r>
+                </a:p>
+              </p:txBody>
+            </p:sp>
+          </mc:Fallback>
+        </mc:AlternateContent>
+        <mc:AlternateContent xmlns:mc="http://schemas.openxmlformats.org/markup-compatibility/2006">
+          <mc:Choice xmlns:a14="http://schemas.microsoft.com/office/drawing/2010/main" Requires="a14">
+            <p:sp>
+              <p:nvSpPr>
+                <p:cNvPr id="25" name="TextBox 24">
+                  <a:extLst>
+                    <a:ext uri="{FF2B5EF4-FFF2-40B4-BE49-F238E27FC236}">
+                      <a16:creationId xmlns:a16="http://schemas.microsoft.com/office/drawing/2014/main" id="{2D23DAD4-2C2F-13A2-915B-082C3A34C899}"/>
+                    </a:ext>
+                  </a:extLst>
+                </p:cNvPr>
+                <p:cNvSpPr txBox="1"/>
+                <p:nvPr/>
+              </p:nvSpPr>
+              <p:spPr>
+                <a:xfrm>
+                  <a:off x="4409087" y="1777205"/>
+                  <a:ext cx="320920" cy="369332"/>
+                </a:xfrm>
+                <a:prstGeom prst="rect">
+                  <a:avLst/>
+                </a:prstGeom>
+                <a:noFill/>
+              </p:spPr>
+              <p:txBody>
+                <a:bodyPr wrap="square" rtlCol="0">
+                  <a:spAutoFit/>
+                </a:bodyPr>
+                <a:lstStyle/>
+                <a:p>
+                  <a14:m>
+                    <m:oMathPara xmlns:m="http://schemas.openxmlformats.org/officeDocument/2006/math">
+                      <m:oMathParaPr>
+                        <m:jc m:val="centerGroup"/>
+                      </m:oMathParaPr>
+                      <m:oMath xmlns:m="http://schemas.openxmlformats.org/officeDocument/2006/math">
+                        <m:sSub>
+                          <m:sSubPr>
+                            <m:ctrlPr>
+                              <a:rPr lang="en-GB" b="0" i="1" smtClean="0">
+                                <a:latin typeface="Cambria Math" panose="02040503050406030204" pitchFamily="18" charset="0"/>
+                              </a:rPr>
+                            </m:ctrlPr>
+                          </m:sSubPr>
+                          <m:e>
+                            <m:r>
+                              <a:rPr lang="en-GB" b="0" i="1" smtClean="0">
+                                <a:latin typeface="Cambria Math" panose="02040503050406030204" pitchFamily="18" charset="0"/>
+                              </a:rPr>
+                              <m:t>𝑠</m:t>
+                            </m:r>
+                          </m:e>
+                          <m:sub>
+                            <m:r>
+                              <a:rPr lang="en-GB" b="0" i="1" smtClean="0">
+                                <a:latin typeface="Cambria Math" panose="02040503050406030204" pitchFamily="18" charset="0"/>
+                              </a:rPr>
+                              <m:t>2</m:t>
+                            </m:r>
+                          </m:sub>
+                        </m:sSub>
+                      </m:oMath>
+                    </m:oMathPara>
+                  </a14:m>
+                  <a:endParaRPr lang="en-GB" b="0" dirty="0"/>
+                </a:p>
+              </p:txBody>
+            </p:sp>
+          </mc:Choice>
+          <mc:Fallback>
+            <p:sp>
+              <p:nvSpPr>
+                <p:cNvPr id="25" name="TextBox 24">
+                  <a:extLst>
+                    <a:ext uri="{FF2B5EF4-FFF2-40B4-BE49-F238E27FC236}">
+                      <a16:creationId xmlns:a16="http://schemas.microsoft.com/office/drawing/2014/main" id="{2D23DAD4-2C2F-13A2-915B-082C3A34C899}"/>
+                    </a:ext>
+                  </a:extLst>
+                </p:cNvPr>
+                <p:cNvSpPr txBox="1">
+                  <a:spLocks noRot="1" noChangeAspect="1" noMove="1" noResize="1" noEditPoints="1" noAdjustHandles="1" noChangeArrowheads="1" noChangeShapeType="1" noTextEdit="1"/>
+                </p:cNvSpPr>
+                <p:nvPr/>
+              </p:nvSpPr>
+              <p:spPr>
+                <a:xfrm>
+                  <a:off x="4409087" y="1777205"/>
+                  <a:ext cx="320920" cy="369332"/>
+                </a:xfrm>
+                <a:prstGeom prst="rect">
+                  <a:avLst/>
+                </a:prstGeom>
+                <a:blipFill>
+                  <a:blip r:embed="rId7"/>
+                  <a:stretch>
+                    <a:fillRect r="-7692"/>
+                  </a:stretch>
+                </a:blipFill>
+              </p:spPr>
+              <p:txBody>
+                <a:bodyPr/>
+                <a:lstStyle/>
+                <a:p>
+                  <a:r>
+                    <a:rPr lang="en-US">
+                      <a:noFill/>
+                    </a:rPr>
+                    <a:t> </a:t>
+                  </a:r>
+                </a:p>
+              </p:txBody>
+            </p:sp>
+          </mc:Fallback>
+        </mc:AlternateContent>
+        <p:sp>
+          <p:nvSpPr>
+            <p:cNvPr id="26" name="TextBox 25">
+              <a:extLst>
+                <a:ext uri="{FF2B5EF4-FFF2-40B4-BE49-F238E27FC236}">
+                  <a16:creationId xmlns:a16="http://schemas.microsoft.com/office/drawing/2014/main" id="{86FCC6E1-1CAF-44C5-3D58-36708EA69339}"/>
+                </a:ext>
+              </a:extLst>
+            </p:cNvPr>
+            <p:cNvSpPr txBox="1"/>
+            <p:nvPr/>
+          </p:nvSpPr>
+          <p:spPr>
+            <a:xfrm>
+              <a:off x="3911385" y="1400671"/>
+              <a:ext cx="688009" cy="369332"/>
+            </a:xfrm>
+            <a:prstGeom prst="rect">
+              <a:avLst/>
+            </a:prstGeom>
+            <a:noFill/>
+          </p:spPr>
+          <p:txBody>
+            <a:bodyPr wrap="none" rtlCol="0">
+              <a:spAutoFit/>
+            </a:bodyPr>
+            <a:lstStyle/>
+            <a:p>
+              <a:r>
+                <a:rPr lang="en-US" dirty="0" err="1"/>
+                <a:t>Im</a:t>
+              </a:r>
+              <a:r>
+                <a:rPr lang="en-US" dirty="0"/>
+                <a:t>{s}</a:t>
+              </a:r>
+            </a:p>
+          </p:txBody>
+        </p:sp>
+        <p:sp>
+          <p:nvSpPr>
+            <p:cNvPr id="27" name="TextBox 26">
+              <a:extLst>
+                <a:ext uri="{FF2B5EF4-FFF2-40B4-BE49-F238E27FC236}">
+                  <a16:creationId xmlns:a16="http://schemas.microsoft.com/office/drawing/2014/main" id="{565F0C94-0A3F-3FFD-30EE-A4153CB980B3}"/>
+                </a:ext>
+              </a:extLst>
+            </p:cNvPr>
+            <p:cNvSpPr txBox="1"/>
+            <p:nvPr/>
+          </p:nvSpPr>
+          <p:spPr>
+            <a:xfrm>
+              <a:off x="5223319" y="2641855"/>
+              <a:ext cx="692818" cy="369332"/>
+            </a:xfrm>
+            <a:prstGeom prst="rect">
+              <a:avLst/>
+            </a:prstGeom>
+            <a:noFill/>
+          </p:spPr>
+          <p:txBody>
+            <a:bodyPr wrap="none" rtlCol="0">
+              <a:spAutoFit/>
+            </a:bodyPr>
+            <a:lstStyle/>
+            <a:p>
+              <a:r>
+                <a:rPr lang="en-US" dirty="0"/>
+                <a:t>Re{s}</a:t>
+              </a:r>
+            </a:p>
+          </p:txBody>
+        </p:sp>
+      </p:grpSp>
     </p:spTree>
     <p:extLst>
       <p:ext uri="{BB962C8B-B14F-4D97-AF65-F5344CB8AC3E}">

</xml_diff>

<commit_message>
Check point 15:22 2024-04-28
</commit_message>
<xml_diff>
--- a/filter_design/pictures/picturespptx.pptx
+++ b/filter_design/pictures/picturespptx.pptx
@@ -261,7 +261,7 @@
           <a:p>
             <a:fld id="{7B652D60-49C2-5845-920F-32F0644ED116}" type="datetimeFigureOut">
               <a:rPr lang="en-US" smtClean="0"/>
-              <a:t>4/17/24</a:t>
+              <a:t>4/28/24</a:t>
             </a:fld>
             <a:endParaRPr lang="en-US"/>
           </a:p>
@@ -461,7 +461,7 @@
           <a:p>
             <a:fld id="{7B652D60-49C2-5845-920F-32F0644ED116}" type="datetimeFigureOut">
               <a:rPr lang="en-US" smtClean="0"/>
-              <a:t>4/17/24</a:t>
+              <a:t>4/28/24</a:t>
             </a:fld>
             <a:endParaRPr lang="en-US"/>
           </a:p>
@@ -671,7 +671,7 @@
           <a:p>
             <a:fld id="{7B652D60-49C2-5845-920F-32F0644ED116}" type="datetimeFigureOut">
               <a:rPr lang="en-US" smtClean="0"/>
-              <a:t>4/17/24</a:t>
+              <a:t>4/28/24</a:t>
             </a:fld>
             <a:endParaRPr lang="en-US"/>
           </a:p>
@@ -871,7 +871,7 @@
           <a:p>
             <a:fld id="{7B652D60-49C2-5845-920F-32F0644ED116}" type="datetimeFigureOut">
               <a:rPr lang="en-US" smtClean="0"/>
-              <a:t>4/17/24</a:t>
+              <a:t>4/28/24</a:t>
             </a:fld>
             <a:endParaRPr lang="en-US"/>
           </a:p>
@@ -1147,7 +1147,7 @@
           <a:p>
             <a:fld id="{7B652D60-49C2-5845-920F-32F0644ED116}" type="datetimeFigureOut">
               <a:rPr lang="en-US" smtClean="0"/>
-              <a:t>4/17/24</a:t>
+              <a:t>4/28/24</a:t>
             </a:fld>
             <a:endParaRPr lang="en-US"/>
           </a:p>
@@ -1415,7 +1415,7 @@
           <a:p>
             <a:fld id="{7B652D60-49C2-5845-920F-32F0644ED116}" type="datetimeFigureOut">
               <a:rPr lang="en-US" smtClean="0"/>
-              <a:t>4/17/24</a:t>
+              <a:t>4/28/24</a:t>
             </a:fld>
             <a:endParaRPr lang="en-US"/>
           </a:p>
@@ -1830,7 +1830,7 @@
           <a:p>
             <a:fld id="{7B652D60-49C2-5845-920F-32F0644ED116}" type="datetimeFigureOut">
               <a:rPr lang="en-US" smtClean="0"/>
-              <a:t>4/17/24</a:t>
+              <a:t>4/28/24</a:t>
             </a:fld>
             <a:endParaRPr lang="en-US"/>
           </a:p>
@@ -1972,7 +1972,7 @@
           <a:p>
             <a:fld id="{7B652D60-49C2-5845-920F-32F0644ED116}" type="datetimeFigureOut">
               <a:rPr lang="en-US" smtClean="0"/>
-              <a:t>4/17/24</a:t>
+              <a:t>4/28/24</a:t>
             </a:fld>
             <a:endParaRPr lang="en-US"/>
           </a:p>
@@ -2085,7 +2085,7 @@
           <a:p>
             <a:fld id="{7B652D60-49C2-5845-920F-32F0644ED116}" type="datetimeFigureOut">
               <a:rPr lang="en-US" smtClean="0"/>
-              <a:t>4/17/24</a:t>
+              <a:t>4/28/24</a:t>
             </a:fld>
             <a:endParaRPr lang="en-US"/>
           </a:p>
@@ -2398,7 +2398,7 @@
           <a:p>
             <a:fld id="{7B652D60-49C2-5845-920F-32F0644ED116}" type="datetimeFigureOut">
               <a:rPr lang="en-US" smtClean="0"/>
-              <a:t>4/17/24</a:t>
+              <a:t>4/28/24</a:t>
             </a:fld>
             <a:endParaRPr lang="en-US"/>
           </a:p>
@@ -2687,7 +2687,7 @@
           <a:p>
             <a:fld id="{7B652D60-49C2-5845-920F-32F0644ED116}" type="datetimeFigureOut">
               <a:rPr lang="en-US" smtClean="0"/>
-              <a:t>4/17/24</a:t>
+              <a:t>4/28/24</a:t>
             </a:fld>
             <a:endParaRPr lang="en-US"/>
           </a:p>
@@ -2930,7 +2930,7 @@
           <a:p>
             <a:fld id="{7B652D60-49C2-5845-920F-32F0644ED116}" type="datetimeFigureOut">
               <a:rPr lang="en-US" smtClean="0"/>
-              <a:t>4/17/24</a:t>
+              <a:t>4/28/24</a:t>
             </a:fld>
             <a:endParaRPr lang="en-US"/>
           </a:p>
@@ -3796,8 +3796,8 @@
             </a:p>
           </p:txBody>
         </p:sp>
-        <mc:AlternateContent xmlns:mc="http://schemas.openxmlformats.org/markup-compatibility/2006">
-          <mc:Choice xmlns:a14="http://schemas.microsoft.com/office/drawing/2010/main" Requires="a14">
+        <mc:AlternateContent xmlns:mc="http://schemas.openxmlformats.org/markup-compatibility/2006" xmlns:a14="http://schemas.microsoft.com/office/drawing/2010/main">
+          <mc:Choice Requires="a14">
             <p:sp>
               <p:nvSpPr>
                 <p:cNvPr id="18" name="TextBox 17">
@@ -3826,6 +3826,7 @@
                 </a:bodyPr>
                 <a:lstStyle/>
                 <a:p>
+                  <a:pPr/>
                   <a14:m>
                     <m:oMathPara xmlns:m="http://schemas.openxmlformats.org/officeDocument/2006/math">
                       <m:oMathParaPr>
@@ -3865,7 +3866,7 @@
               </p:txBody>
             </p:sp>
           </mc:Choice>
-          <mc:Fallback>
+          <mc:Fallback xmlns="">
             <p:sp>
               <p:nvSpPr>
                 <p:cNvPr id="18" name="TextBox 17">
@@ -3910,8 +3911,8 @@
             </p:sp>
           </mc:Fallback>
         </mc:AlternateContent>
-        <mc:AlternateContent xmlns:mc="http://schemas.openxmlformats.org/markup-compatibility/2006">
-          <mc:Choice xmlns:a14="http://schemas.microsoft.com/office/drawing/2010/main" Requires="a14">
+        <mc:AlternateContent xmlns:mc="http://schemas.openxmlformats.org/markup-compatibility/2006" xmlns:a14="http://schemas.microsoft.com/office/drawing/2010/main">
+          <mc:Choice Requires="a14">
             <p:sp>
               <p:nvSpPr>
                 <p:cNvPr id="21" name="TextBox 20">
@@ -3940,6 +3941,7 @@
                 </a:bodyPr>
                 <a:lstStyle/>
                 <a:p>
+                  <a:pPr/>
                   <a14:m>
                     <m:oMathPara xmlns:m="http://schemas.openxmlformats.org/officeDocument/2006/math">
                       <m:oMathParaPr>
@@ -3979,7 +3981,7 @@
               </p:txBody>
             </p:sp>
           </mc:Choice>
-          <mc:Fallback>
+          <mc:Fallback xmlns="">
             <p:sp>
               <p:nvSpPr>
                 <p:cNvPr id="21" name="TextBox 20">
@@ -4024,8 +4026,8 @@
             </p:sp>
           </mc:Fallback>
         </mc:AlternateContent>
-        <mc:AlternateContent xmlns:mc="http://schemas.openxmlformats.org/markup-compatibility/2006">
-          <mc:Choice xmlns:a14="http://schemas.microsoft.com/office/drawing/2010/main" Requires="a14">
+        <mc:AlternateContent xmlns:mc="http://schemas.openxmlformats.org/markup-compatibility/2006" xmlns:a14="http://schemas.microsoft.com/office/drawing/2010/main">
+          <mc:Choice Requires="a14">
             <p:sp>
               <p:nvSpPr>
                 <p:cNvPr id="22" name="TextBox 21">
@@ -4054,6 +4056,7 @@
                 </a:bodyPr>
                 <a:lstStyle/>
                 <a:p>
+                  <a:pPr/>
                   <a14:m>
                     <m:oMathPara xmlns:m="http://schemas.openxmlformats.org/officeDocument/2006/math">
                       <m:oMathParaPr>
@@ -4093,7 +4096,7 @@
               </p:txBody>
             </p:sp>
           </mc:Choice>
-          <mc:Fallback>
+          <mc:Fallback xmlns="">
             <p:sp>
               <p:nvSpPr>
                 <p:cNvPr id="22" name="TextBox 21">
@@ -4138,8 +4141,8 @@
             </p:sp>
           </mc:Fallback>
         </mc:AlternateContent>
-        <mc:AlternateContent xmlns:mc="http://schemas.openxmlformats.org/markup-compatibility/2006">
-          <mc:Choice xmlns:a14="http://schemas.microsoft.com/office/drawing/2010/main" Requires="a14">
+        <mc:AlternateContent xmlns:mc="http://schemas.openxmlformats.org/markup-compatibility/2006" xmlns:a14="http://schemas.microsoft.com/office/drawing/2010/main">
+          <mc:Choice Requires="a14">
             <p:sp>
               <p:nvSpPr>
                 <p:cNvPr id="23" name="TextBox 22">
@@ -4168,6 +4171,7 @@
                 </a:bodyPr>
                 <a:lstStyle/>
                 <a:p>
+                  <a:pPr/>
                   <a14:m>
                     <m:oMathPara xmlns:m="http://schemas.openxmlformats.org/officeDocument/2006/math">
                       <m:oMathParaPr>
@@ -4207,7 +4211,7 @@
               </p:txBody>
             </p:sp>
           </mc:Choice>
-          <mc:Fallback>
+          <mc:Fallback xmlns="">
             <p:sp>
               <p:nvSpPr>
                 <p:cNvPr id="23" name="TextBox 22">
@@ -4252,8 +4256,8 @@
             </p:sp>
           </mc:Fallback>
         </mc:AlternateContent>
-        <mc:AlternateContent xmlns:mc="http://schemas.openxmlformats.org/markup-compatibility/2006">
-          <mc:Choice xmlns:a14="http://schemas.microsoft.com/office/drawing/2010/main" Requires="a14">
+        <mc:AlternateContent xmlns:mc="http://schemas.openxmlformats.org/markup-compatibility/2006" xmlns:a14="http://schemas.microsoft.com/office/drawing/2010/main">
+          <mc:Choice Requires="a14">
             <p:sp>
               <p:nvSpPr>
                 <p:cNvPr id="24" name="TextBox 23">
@@ -4282,6 +4286,7 @@
                 </a:bodyPr>
                 <a:lstStyle/>
                 <a:p>
+                  <a:pPr/>
                   <a14:m>
                     <m:oMathPara xmlns:m="http://schemas.openxmlformats.org/officeDocument/2006/math">
                       <m:oMathParaPr>
@@ -4321,7 +4326,7 @@
               </p:txBody>
             </p:sp>
           </mc:Choice>
-          <mc:Fallback>
+          <mc:Fallback xmlns="">
             <p:sp>
               <p:nvSpPr>
                 <p:cNvPr id="24" name="TextBox 23">
@@ -4366,8 +4371,8 @@
             </p:sp>
           </mc:Fallback>
         </mc:AlternateContent>
-        <mc:AlternateContent xmlns:mc="http://schemas.openxmlformats.org/markup-compatibility/2006">
-          <mc:Choice xmlns:a14="http://schemas.microsoft.com/office/drawing/2010/main" Requires="a14">
+        <mc:AlternateContent xmlns:mc="http://schemas.openxmlformats.org/markup-compatibility/2006" xmlns:a14="http://schemas.microsoft.com/office/drawing/2010/main">
+          <mc:Choice Requires="a14">
             <p:sp>
               <p:nvSpPr>
                 <p:cNvPr id="25" name="TextBox 24">
@@ -4396,6 +4401,7 @@
                 </a:bodyPr>
                 <a:lstStyle/>
                 <a:p>
+                  <a:pPr/>
                   <a14:m>
                     <m:oMathPara xmlns:m="http://schemas.openxmlformats.org/officeDocument/2006/math">
                       <m:oMathParaPr>
@@ -4435,7 +4441,7 @@
               </p:txBody>
             </p:sp>
           </mc:Choice>
-          <mc:Fallback>
+          <mc:Fallback xmlns="">
             <p:sp>
               <p:nvSpPr>
                 <p:cNvPr id="25" name="TextBox 24">
@@ -4554,6 +4560,1202 @@
             </a:p>
           </p:txBody>
         </p:sp>
+      </p:grpSp>
+      <p:grpSp>
+        <p:nvGrpSpPr>
+          <p:cNvPr id="45" name="Group 44">
+            <a:extLst>
+              <a:ext uri="{FF2B5EF4-FFF2-40B4-BE49-F238E27FC236}">
+                <a16:creationId xmlns:a16="http://schemas.microsoft.com/office/drawing/2014/main" id="{FCB5B35A-7C0D-28E8-D41C-CAA848A3C3D9}"/>
+              </a:ext>
+            </a:extLst>
+          </p:cNvPr>
+          <p:cNvGrpSpPr/>
+          <p:nvPr/>
+        </p:nvGrpSpPr>
+        <p:grpSpPr>
+          <a:xfrm>
+            <a:off x="1239361" y="5026405"/>
+            <a:ext cx="9721401" cy="861848"/>
+            <a:chOff x="1239361" y="5026405"/>
+            <a:chExt cx="9721401" cy="861848"/>
+          </a:xfrm>
+        </p:grpSpPr>
+        <p:grpSp>
+          <p:nvGrpSpPr>
+            <p:cNvPr id="20" name="Group 19">
+              <a:extLst>
+                <a:ext uri="{FF2B5EF4-FFF2-40B4-BE49-F238E27FC236}">
+                  <a16:creationId xmlns:a16="http://schemas.microsoft.com/office/drawing/2014/main" id="{C83BA6F0-FB89-51E1-3AD0-A3FE75A584E2}"/>
+                </a:ext>
+              </a:extLst>
+            </p:cNvPr>
+            <p:cNvGrpSpPr/>
+            <p:nvPr/>
+          </p:nvGrpSpPr>
+          <p:grpSpPr>
+            <a:xfrm>
+              <a:off x="2815828" y="5026405"/>
+              <a:ext cx="1198180" cy="861848"/>
+              <a:chOff x="6442841" y="4382814"/>
+              <a:chExt cx="1198180" cy="861848"/>
+            </a:xfrm>
+          </p:grpSpPr>
+          <p:sp>
+            <p:nvSpPr>
+              <p:cNvPr id="3" name="Rectangle 2">
+                <a:extLst>
+                  <a:ext uri="{FF2B5EF4-FFF2-40B4-BE49-F238E27FC236}">
+                    <a16:creationId xmlns:a16="http://schemas.microsoft.com/office/drawing/2014/main" id="{62A80C87-5939-5E5B-3496-C7D79F81E124}"/>
+                  </a:ext>
+                </a:extLst>
+              </p:cNvPr>
+              <p:cNvSpPr/>
+              <p:nvPr/>
+            </p:nvSpPr>
+            <p:spPr>
+              <a:xfrm>
+                <a:off x="6442841" y="4382814"/>
+                <a:ext cx="1198180" cy="861848"/>
+              </a:xfrm>
+              <a:prstGeom prst="rect">
+                <a:avLst/>
+              </a:prstGeom>
+              <a:noFill/>
+            </p:spPr>
+            <p:style>
+              <a:lnRef idx="2">
+                <a:schemeClr val="accent1">
+                  <a:shade val="15000"/>
+                </a:schemeClr>
+              </a:lnRef>
+              <a:fillRef idx="1">
+                <a:schemeClr val="accent1"/>
+              </a:fillRef>
+              <a:effectRef idx="0">
+                <a:schemeClr val="accent1"/>
+              </a:effectRef>
+              <a:fontRef idx="minor">
+                <a:schemeClr val="lt1"/>
+              </a:fontRef>
+            </p:style>
+            <p:txBody>
+              <a:bodyPr rtlCol="0" anchor="ctr"/>
+              <a:lstStyle/>
+              <a:p>
+                <a:pPr algn="ctr"/>
+                <a:endParaRPr lang="en-US"/>
+              </a:p>
+            </p:txBody>
+          </p:sp>
+          <mc:AlternateContent xmlns:mc="http://schemas.openxmlformats.org/markup-compatibility/2006">
+            <mc:Choice xmlns:a14="http://schemas.microsoft.com/office/drawing/2010/main" Requires="a14">
+              <p:sp>
+                <p:nvSpPr>
+                  <p:cNvPr id="6" name="TextBox 5">
+                    <a:extLst>
+                      <a:ext uri="{FF2B5EF4-FFF2-40B4-BE49-F238E27FC236}">
+                        <a16:creationId xmlns:a16="http://schemas.microsoft.com/office/drawing/2014/main" id="{C5B7A5B7-DFF6-E76F-AE38-165141E5EC4D}"/>
+                      </a:ext>
+                    </a:extLst>
+                  </p:cNvPr>
+                  <p:cNvSpPr txBox="1"/>
+                  <p:nvPr/>
+                </p:nvSpPr>
+                <p:spPr>
+                  <a:xfrm>
+                    <a:off x="6643681" y="4598331"/>
+                    <a:ext cx="796500" cy="646331"/>
+                  </a:xfrm>
+                  <a:prstGeom prst="rect">
+                    <a:avLst/>
+                  </a:prstGeom>
+                  <a:noFill/>
+                </p:spPr>
+                <p:txBody>
+                  <a:bodyPr wrap="none" rtlCol="0">
+                    <a:spAutoFit/>
+                  </a:bodyPr>
+                  <a:lstStyle/>
+                  <a:p>
+                    <a14:m>
+                      <m:oMathPara xmlns:m="http://schemas.openxmlformats.org/officeDocument/2006/math">
+                        <m:oMathParaPr>
+                          <m:jc m:val="centerGroup"/>
+                        </m:oMathParaPr>
+                        <m:oMath xmlns:m="http://schemas.openxmlformats.org/officeDocument/2006/math">
+                          <m:sSub>
+                            <m:sSubPr>
+                              <m:ctrlPr>
+                                <a:rPr lang="en-GB" b="0" i="1" smtClean="0">
+                                  <a:latin typeface="Cambria Math" panose="02040503050406030204" pitchFamily="18" charset="0"/>
+                                </a:rPr>
+                              </m:ctrlPr>
+                            </m:sSubPr>
+                            <m:e>
+                              <m:r>
+                                <a:rPr lang="en-GB" b="0" i="1" smtClean="0">
+                                  <a:latin typeface="Cambria Math" panose="02040503050406030204" pitchFamily="18" charset="0"/>
+                                </a:rPr>
+                                <m:t>𝐻</m:t>
+                              </m:r>
+                            </m:e>
+                            <m:sub>
+                              <m:r>
+                                <a:rPr lang="en-GB" b="0" i="1" smtClean="0">
+                                  <a:latin typeface="Cambria Math" panose="02040503050406030204" pitchFamily="18" charset="0"/>
+                                </a:rPr>
+                                <m:t>1</m:t>
+                              </m:r>
+                            </m:sub>
+                          </m:sSub>
+                          <m:r>
+                            <a:rPr lang="en-GB" b="0" i="1" smtClean="0">
+                              <a:latin typeface="Cambria Math" panose="02040503050406030204" pitchFamily="18" charset="0"/>
+                            </a:rPr>
+                            <m:t>(</m:t>
+                          </m:r>
+                          <m:r>
+                            <a:rPr lang="en-GB" b="0" i="1" smtClean="0">
+                              <a:latin typeface="Cambria Math" panose="02040503050406030204" pitchFamily="18" charset="0"/>
+                            </a:rPr>
+                            <m:t>𝑧</m:t>
+                          </m:r>
+                          <m:r>
+                            <a:rPr lang="en-GB" b="0" i="1" smtClean="0">
+                              <a:latin typeface="Cambria Math" panose="02040503050406030204" pitchFamily="18" charset="0"/>
+                            </a:rPr>
+                            <m:t>)</m:t>
+                          </m:r>
+                        </m:oMath>
+                      </m:oMathPara>
+                    </a14:m>
+                    <a:endParaRPr lang="en-GB" b="0" dirty="0"/>
+                  </a:p>
+                  <a:p>
+                    <a:endParaRPr lang="en-US" dirty="0"/>
+                  </a:p>
+                </p:txBody>
+              </p:sp>
+            </mc:Choice>
+            <mc:Fallback>
+              <p:sp>
+                <p:nvSpPr>
+                  <p:cNvPr id="6" name="TextBox 5">
+                    <a:extLst>
+                      <a:ext uri="{FF2B5EF4-FFF2-40B4-BE49-F238E27FC236}">
+                        <a16:creationId xmlns:a16="http://schemas.microsoft.com/office/drawing/2014/main" id="{C5B7A5B7-DFF6-E76F-AE38-165141E5EC4D}"/>
+                      </a:ext>
+                    </a:extLst>
+                  </p:cNvPr>
+                  <p:cNvSpPr txBox="1">
+                    <a:spLocks noRot="1" noChangeAspect="1" noMove="1" noResize="1" noEditPoints="1" noAdjustHandles="1" noChangeArrowheads="1" noChangeShapeType="1" noTextEdit="1"/>
+                  </p:cNvSpPr>
+                  <p:nvPr/>
+                </p:nvSpPr>
+                <p:spPr>
+                  <a:xfrm>
+                    <a:off x="6643681" y="4598331"/>
+                    <a:ext cx="796500" cy="646331"/>
+                  </a:xfrm>
+                  <a:prstGeom prst="rect">
+                    <a:avLst/>
+                  </a:prstGeom>
+                  <a:blipFill>
+                    <a:blip r:embed="rId8"/>
+                    <a:stretch>
+                      <a:fillRect/>
+                    </a:stretch>
+                  </a:blipFill>
+                </p:spPr>
+                <p:txBody>
+                  <a:bodyPr/>
+                  <a:lstStyle/>
+                  <a:p>
+                    <a:r>
+                      <a:rPr lang="en-US">
+                        <a:noFill/>
+                      </a:rPr>
+                      <a:t> </a:t>
+                    </a:r>
+                  </a:p>
+                </p:txBody>
+              </p:sp>
+            </mc:Fallback>
+          </mc:AlternateContent>
+        </p:grpSp>
+        <p:grpSp>
+          <p:nvGrpSpPr>
+            <p:cNvPr id="28" name="Group 27">
+              <a:extLst>
+                <a:ext uri="{FF2B5EF4-FFF2-40B4-BE49-F238E27FC236}">
+                  <a16:creationId xmlns:a16="http://schemas.microsoft.com/office/drawing/2014/main" id="{48C20F07-E7F2-AC6F-8C45-C4B479BA5993}"/>
+                </a:ext>
+              </a:extLst>
+            </p:cNvPr>
+            <p:cNvGrpSpPr/>
+            <p:nvPr/>
+          </p:nvGrpSpPr>
+          <p:grpSpPr>
+            <a:xfrm>
+              <a:off x="4733494" y="5026405"/>
+              <a:ext cx="1198180" cy="861848"/>
+              <a:chOff x="7745268" y="4382814"/>
+              <a:chExt cx="1198180" cy="861848"/>
+            </a:xfrm>
+          </p:grpSpPr>
+          <p:sp>
+            <p:nvSpPr>
+              <p:cNvPr id="9" name="Rectangle 8">
+                <a:extLst>
+                  <a:ext uri="{FF2B5EF4-FFF2-40B4-BE49-F238E27FC236}">
+                    <a16:creationId xmlns:a16="http://schemas.microsoft.com/office/drawing/2014/main" id="{568D4FF8-2BDA-13EE-982F-9D8DDE1498EE}"/>
+                  </a:ext>
+                </a:extLst>
+              </p:cNvPr>
+              <p:cNvSpPr/>
+              <p:nvPr/>
+            </p:nvSpPr>
+            <p:spPr>
+              <a:xfrm>
+                <a:off x="7745268" y="4382814"/>
+                <a:ext cx="1198180" cy="861848"/>
+              </a:xfrm>
+              <a:prstGeom prst="rect">
+                <a:avLst/>
+              </a:prstGeom>
+              <a:noFill/>
+            </p:spPr>
+            <p:style>
+              <a:lnRef idx="2">
+                <a:schemeClr val="accent1">
+                  <a:shade val="15000"/>
+                </a:schemeClr>
+              </a:lnRef>
+              <a:fillRef idx="1">
+                <a:schemeClr val="accent1"/>
+              </a:fillRef>
+              <a:effectRef idx="0">
+                <a:schemeClr val="accent1"/>
+              </a:effectRef>
+              <a:fontRef idx="minor">
+                <a:schemeClr val="lt1"/>
+              </a:fontRef>
+            </p:style>
+            <p:txBody>
+              <a:bodyPr rtlCol="0" anchor="ctr"/>
+              <a:lstStyle/>
+              <a:p>
+                <a:pPr algn="ctr"/>
+                <a:endParaRPr lang="en-US"/>
+              </a:p>
+            </p:txBody>
+          </p:sp>
+          <mc:AlternateContent xmlns:mc="http://schemas.openxmlformats.org/markup-compatibility/2006">
+            <mc:Choice xmlns:a14="http://schemas.microsoft.com/office/drawing/2010/main" Requires="a14">
+              <p:sp>
+                <p:nvSpPr>
+                  <p:cNvPr id="11" name="TextBox 10">
+                    <a:extLst>
+                      <a:ext uri="{FF2B5EF4-FFF2-40B4-BE49-F238E27FC236}">
+                        <a16:creationId xmlns:a16="http://schemas.microsoft.com/office/drawing/2014/main" id="{BE9E1A7B-0FA5-5646-DA35-F0D0F8014852}"/>
+                      </a:ext>
+                    </a:extLst>
+                  </p:cNvPr>
+                  <p:cNvSpPr txBox="1"/>
+                  <p:nvPr/>
+                </p:nvSpPr>
+                <p:spPr>
+                  <a:xfrm>
+                    <a:off x="7931424" y="4598331"/>
+                    <a:ext cx="825867" cy="646331"/>
+                  </a:xfrm>
+                  <a:prstGeom prst="rect">
+                    <a:avLst/>
+                  </a:prstGeom>
+                  <a:noFill/>
+                </p:spPr>
+                <p:txBody>
+                  <a:bodyPr wrap="none" rtlCol="0">
+                    <a:spAutoFit/>
+                  </a:bodyPr>
+                  <a:lstStyle/>
+                  <a:p>
+                    <a14:m>
+                      <m:oMathPara xmlns:m="http://schemas.openxmlformats.org/officeDocument/2006/math">
+                        <m:oMathParaPr>
+                          <m:jc m:val="centerGroup"/>
+                        </m:oMathParaPr>
+                        <m:oMath xmlns:m="http://schemas.openxmlformats.org/officeDocument/2006/math">
+                          <m:sSub>
+                            <m:sSubPr>
+                              <m:ctrlPr>
+                                <a:rPr lang="en-GB" b="0" i="1" smtClean="0">
+                                  <a:latin typeface="Cambria Math" panose="02040503050406030204" pitchFamily="18" charset="0"/>
+                                </a:rPr>
+                              </m:ctrlPr>
+                            </m:sSubPr>
+                            <m:e>
+                              <m:r>
+                                <a:rPr lang="en-GB" b="0" i="1" smtClean="0">
+                                  <a:latin typeface="Cambria Math" panose="02040503050406030204" pitchFamily="18" charset="0"/>
+                                </a:rPr>
+                                <m:t>𝐻</m:t>
+                              </m:r>
+                            </m:e>
+                            <m:sub>
+                              <m:r>
+                                <a:rPr lang="en-GB" b="0" i="1" smtClean="0">
+                                  <a:latin typeface="Cambria Math" panose="02040503050406030204" pitchFamily="18" charset="0"/>
+                                </a:rPr>
+                                <m:t>2</m:t>
+                              </m:r>
+                            </m:sub>
+                          </m:sSub>
+                          <m:r>
+                            <a:rPr lang="en-GB" b="0" i="1" smtClean="0">
+                              <a:latin typeface="Cambria Math" panose="02040503050406030204" pitchFamily="18" charset="0"/>
+                            </a:rPr>
+                            <m:t>(</m:t>
+                          </m:r>
+                          <m:r>
+                            <a:rPr lang="en-GB" b="0" i="1" smtClean="0">
+                              <a:latin typeface="Cambria Math" panose="02040503050406030204" pitchFamily="18" charset="0"/>
+                            </a:rPr>
+                            <m:t>𝑧</m:t>
+                          </m:r>
+                          <m:r>
+                            <a:rPr lang="en-GB" b="0" i="1" smtClean="0">
+                              <a:latin typeface="Cambria Math" panose="02040503050406030204" pitchFamily="18" charset="0"/>
+                            </a:rPr>
+                            <m:t>)</m:t>
+                          </m:r>
+                        </m:oMath>
+                      </m:oMathPara>
+                    </a14:m>
+                    <a:endParaRPr lang="en-GB" b="0" dirty="0"/>
+                  </a:p>
+                  <a:p>
+                    <a:endParaRPr lang="en-US" dirty="0"/>
+                  </a:p>
+                </p:txBody>
+              </p:sp>
+            </mc:Choice>
+            <mc:Fallback>
+              <p:sp>
+                <p:nvSpPr>
+                  <p:cNvPr id="11" name="TextBox 10">
+                    <a:extLst>
+                      <a:ext uri="{FF2B5EF4-FFF2-40B4-BE49-F238E27FC236}">
+                        <a16:creationId xmlns:a16="http://schemas.microsoft.com/office/drawing/2014/main" id="{BE9E1A7B-0FA5-5646-DA35-F0D0F8014852}"/>
+                      </a:ext>
+                    </a:extLst>
+                  </p:cNvPr>
+                  <p:cNvSpPr txBox="1">
+                    <a:spLocks noRot="1" noChangeAspect="1" noMove="1" noResize="1" noEditPoints="1" noAdjustHandles="1" noChangeArrowheads="1" noChangeShapeType="1" noTextEdit="1"/>
+                  </p:cNvSpPr>
+                  <p:nvPr/>
+                </p:nvSpPr>
+                <p:spPr>
+                  <a:xfrm>
+                    <a:off x="7931424" y="4598331"/>
+                    <a:ext cx="825867" cy="646331"/>
+                  </a:xfrm>
+                  <a:prstGeom prst="rect">
+                    <a:avLst/>
+                  </a:prstGeom>
+                  <a:blipFill>
+                    <a:blip r:embed="rId9"/>
+                    <a:stretch>
+                      <a:fillRect/>
+                    </a:stretch>
+                  </a:blipFill>
+                </p:spPr>
+                <p:txBody>
+                  <a:bodyPr/>
+                  <a:lstStyle/>
+                  <a:p>
+                    <a:r>
+                      <a:rPr lang="en-US">
+                        <a:noFill/>
+                      </a:rPr>
+                      <a:t> </a:t>
+                    </a:r>
+                  </a:p>
+                </p:txBody>
+              </p:sp>
+            </mc:Fallback>
+          </mc:AlternateContent>
+        </p:grpSp>
+        <p:grpSp>
+          <p:nvGrpSpPr>
+            <p:cNvPr id="29" name="Group 28">
+              <a:extLst>
+                <a:ext uri="{FF2B5EF4-FFF2-40B4-BE49-F238E27FC236}">
+                  <a16:creationId xmlns:a16="http://schemas.microsoft.com/office/drawing/2014/main" id="{EB88C9E1-1E12-0106-0204-FD5ABE110FE0}"/>
+                </a:ext>
+              </a:extLst>
+            </p:cNvPr>
+            <p:cNvGrpSpPr/>
+            <p:nvPr/>
+          </p:nvGrpSpPr>
+          <p:grpSpPr>
+            <a:xfrm>
+              <a:off x="8217191" y="5026405"/>
+              <a:ext cx="1198180" cy="861848"/>
+              <a:chOff x="10426261" y="4382814"/>
+              <a:chExt cx="1198180" cy="861848"/>
+            </a:xfrm>
+          </p:grpSpPr>
+          <p:sp>
+            <p:nvSpPr>
+              <p:cNvPr id="13" name="Rectangle 12">
+                <a:extLst>
+                  <a:ext uri="{FF2B5EF4-FFF2-40B4-BE49-F238E27FC236}">
+                    <a16:creationId xmlns:a16="http://schemas.microsoft.com/office/drawing/2014/main" id="{71BCB8C4-FCEE-5321-061E-9042BE8488A1}"/>
+                  </a:ext>
+                </a:extLst>
+              </p:cNvPr>
+              <p:cNvSpPr/>
+              <p:nvPr/>
+            </p:nvSpPr>
+            <p:spPr>
+              <a:xfrm>
+                <a:off x="10426261" y="4382814"/>
+                <a:ext cx="1198180" cy="861848"/>
+              </a:xfrm>
+              <a:prstGeom prst="rect">
+                <a:avLst/>
+              </a:prstGeom>
+              <a:noFill/>
+            </p:spPr>
+            <p:style>
+              <a:lnRef idx="2">
+                <a:schemeClr val="accent1">
+                  <a:shade val="15000"/>
+                </a:schemeClr>
+              </a:lnRef>
+              <a:fillRef idx="1">
+                <a:schemeClr val="accent1"/>
+              </a:fillRef>
+              <a:effectRef idx="0">
+                <a:schemeClr val="accent1"/>
+              </a:effectRef>
+              <a:fontRef idx="minor">
+                <a:schemeClr val="lt1"/>
+              </a:fontRef>
+            </p:style>
+            <p:txBody>
+              <a:bodyPr rtlCol="0" anchor="ctr"/>
+              <a:lstStyle/>
+              <a:p>
+                <a:pPr algn="ctr"/>
+                <a:endParaRPr lang="en-US"/>
+              </a:p>
+            </p:txBody>
+          </p:sp>
+          <mc:AlternateContent xmlns:mc="http://schemas.openxmlformats.org/markup-compatibility/2006">
+            <mc:Choice xmlns:a14="http://schemas.microsoft.com/office/drawing/2010/main" Requires="a14">
+              <p:sp>
+                <p:nvSpPr>
+                  <p:cNvPr id="19" name="TextBox 18">
+                    <a:extLst>
+                      <a:ext uri="{FF2B5EF4-FFF2-40B4-BE49-F238E27FC236}">
+                        <a16:creationId xmlns:a16="http://schemas.microsoft.com/office/drawing/2014/main" id="{EF101761-B23C-EBB9-3748-6CD6ADEDBF3A}"/>
+                      </a:ext>
+                    </a:extLst>
+                  </p:cNvPr>
+                  <p:cNvSpPr txBox="1"/>
+                  <p:nvPr/>
+                </p:nvSpPr>
+                <p:spPr>
+                  <a:xfrm>
+                    <a:off x="10627101" y="4598331"/>
+                    <a:ext cx="834780" cy="646331"/>
+                  </a:xfrm>
+                  <a:prstGeom prst="rect">
+                    <a:avLst/>
+                  </a:prstGeom>
+                  <a:noFill/>
+                </p:spPr>
+                <p:txBody>
+                  <a:bodyPr wrap="none" rtlCol="0">
+                    <a:spAutoFit/>
+                  </a:bodyPr>
+                  <a:lstStyle/>
+                  <a:p>
+                    <a14:m>
+                      <m:oMathPara xmlns:m="http://schemas.openxmlformats.org/officeDocument/2006/math">
+                        <m:oMathParaPr>
+                          <m:jc m:val="centerGroup"/>
+                        </m:oMathParaPr>
+                        <m:oMath xmlns:m="http://schemas.openxmlformats.org/officeDocument/2006/math">
+                          <m:sSub>
+                            <m:sSubPr>
+                              <m:ctrlPr>
+                                <a:rPr lang="en-GB" b="0" i="1" smtClean="0">
+                                  <a:latin typeface="Cambria Math" panose="02040503050406030204" pitchFamily="18" charset="0"/>
+                                </a:rPr>
+                              </m:ctrlPr>
+                            </m:sSubPr>
+                            <m:e>
+                              <m:r>
+                                <a:rPr lang="en-GB" b="0" i="1" smtClean="0">
+                                  <a:latin typeface="Cambria Math" panose="02040503050406030204" pitchFamily="18" charset="0"/>
+                                </a:rPr>
+                                <m:t>𝐻</m:t>
+                              </m:r>
+                            </m:e>
+                            <m:sub>
+                              <m:r>
+                                <a:rPr lang="en-GB" b="0" i="1" smtClean="0">
+                                  <a:latin typeface="Cambria Math" panose="02040503050406030204" pitchFamily="18" charset="0"/>
+                                </a:rPr>
+                                <m:t>𝑅</m:t>
+                              </m:r>
+                            </m:sub>
+                          </m:sSub>
+                          <m:r>
+                            <a:rPr lang="en-GB" b="0" i="1" smtClean="0">
+                              <a:latin typeface="Cambria Math" panose="02040503050406030204" pitchFamily="18" charset="0"/>
+                            </a:rPr>
+                            <m:t>(</m:t>
+                          </m:r>
+                          <m:r>
+                            <a:rPr lang="en-GB" b="0" i="1" smtClean="0">
+                              <a:latin typeface="Cambria Math" panose="02040503050406030204" pitchFamily="18" charset="0"/>
+                            </a:rPr>
+                            <m:t>𝑧</m:t>
+                          </m:r>
+                          <m:r>
+                            <a:rPr lang="en-GB" b="0" i="1" smtClean="0">
+                              <a:latin typeface="Cambria Math" panose="02040503050406030204" pitchFamily="18" charset="0"/>
+                            </a:rPr>
+                            <m:t>)</m:t>
+                          </m:r>
+                        </m:oMath>
+                      </m:oMathPara>
+                    </a14:m>
+                    <a:endParaRPr lang="en-GB" b="0" dirty="0"/>
+                  </a:p>
+                  <a:p>
+                    <a:endParaRPr lang="en-US" dirty="0"/>
+                  </a:p>
+                </p:txBody>
+              </p:sp>
+            </mc:Choice>
+            <mc:Fallback>
+              <p:sp>
+                <p:nvSpPr>
+                  <p:cNvPr id="19" name="TextBox 18">
+                    <a:extLst>
+                      <a:ext uri="{FF2B5EF4-FFF2-40B4-BE49-F238E27FC236}">
+                        <a16:creationId xmlns:a16="http://schemas.microsoft.com/office/drawing/2014/main" id="{EF101761-B23C-EBB9-3748-6CD6ADEDBF3A}"/>
+                      </a:ext>
+                    </a:extLst>
+                  </p:cNvPr>
+                  <p:cNvSpPr txBox="1">
+                    <a:spLocks noRot="1" noChangeAspect="1" noMove="1" noResize="1" noEditPoints="1" noAdjustHandles="1" noChangeArrowheads="1" noChangeShapeType="1" noTextEdit="1"/>
+                  </p:cNvSpPr>
+                  <p:nvPr/>
+                </p:nvSpPr>
+                <p:spPr>
+                  <a:xfrm>
+                    <a:off x="10627101" y="4598331"/>
+                    <a:ext cx="834780" cy="646331"/>
+                  </a:xfrm>
+                  <a:prstGeom prst="rect">
+                    <a:avLst/>
+                  </a:prstGeom>
+                  <a:blipFill>
+                    <a:blip r:embed="rId10"/>
+                    <a:stretch>
+                      <a:fillRect/>
+                    </a:stretch>
+                  </a:blipFill>
+                </p:spPr>
+                <p:txBody>
+                  <a:bodyPr/>
+                  <a:lstStyle/>
+                  <a:p>
+                    <a:r>
+                      <a:rPr lang="en-US">
+                        <a:noFill/>
+                      </a:rPr>
+                      <a:t> </a:t>
+                    </a:r>
+                  </a:p>
+                </p:txBody>
+              </p:sp>
+            </mc:Fallback>
+          </mc:AlternateContent>
+        </p:grpSp>
+        <p:cxnSp>
+          <p:nvCxnSpPr>
+            <p:cNvPr id="32" name="Straight Arrow Connector 31">
+              <a:extLst>
+                <a:ext uri="{FF2B5EF4-FFF2-40B4-BE49-F238E27FC236}">
+                  <a16:creationId xmlns:a16="http://schemas.microsoft.com/office/drawing/2014/main" id="{614FCF87-A9C2-A723-7CE6-8DDD8C61CBAE}"/>
+                </a:ext>
+              </a:extLst>
+            </p:cNvPr>
+            <p:cNvCxnSpPr>
+              <a:cxnSpLocks/>
+            </p:cNvCxnSpPr>
+            <p:nvPr/>
+          </p:nvCxnSpPr>
+          <p:spPr>
+            <a:xfrm>
+              <a:off x="4014008" y="5457329"/>
+              <a:ext cx="719486" cy="0"/>
+            </a:xfrm>
+            <a:prstGeom prst="straightConnector1">
+              <a:avLst/>
+            </a:prstGeom>
+            <a:ln>
+              <a:tailEnd type="triangle"/>
+            </a:ln>
+          </p:spPr>
+          <p:style>
+            <a:lnRef idx="2">
+              <a:schemeClr val="accent1"/>
+            </a:lnRef>
+            <a:fillRef idx="0">
+              <a:schemeClr val="accent1"/>
+            </a:fillRef>
+            <a:effectRef idx="1">
+              <a:schemeClr val="accent1"/>
+            </a:effectRef>
+            <a:fontRef idx="minor">
+              <a:schemeClr val="tx1"/>
+            </a:fontRef>
+          </p:style>
+        </p:cxnSp>
+        <p:cxnSp>
+          <p:nvCxnSpPr>
+            <p:cNvPr id="33" name="Straight Arrow Connector 32">
+              <a:extLst>
+                <a:ext uri="{FF2B5EF4-FFF2-40B4-BE49-F238E27FC236}">
+                  <a16:creationId xmlns:a16="http://schemas.microsoft.com/office/drawing/2014/main" id="{0D7FE49D-3C5D-3144-5931-47843E561054}"/>
+                </a:ext>
+              </a:extLst>
+            </p:cNvPr>
+            <p:cNvCxnSpPr>
+              <a:cxnSpLocks/>
+            </p:cNvCxnSpPr>
+            <p:nvPr/>
+          </p:nvCxnSpPr>
+          <p:spPr>
+            <a:xfrm>
+              <a:off x="5931674" y="5457329"/>
+              <a:ext cx="719486" cy="0"/>
+            </a:xfrm>
+            <a:prstGeom prst="straightConnector1">
+              <a:avLst/>
+            </a:prstGeom>
+            <a:ln>
+              <a:tailEnd type="triangle"/>
+            </a:ln>
+          </p:spPr>
+          <p:style>
+            <a:lnRef idx="2">
+              <a:schemeClr val="accent1"/>
+            </a:lnRef>
+            <a:fillRef idx="0">
+              <a:schemeClr val="accent1"/>
+            </a:fillRef>
+            <a:effectRef idx="1">
+              <a:schemeClr val="accent1"/>
+            </a:effectRef>
+            <a:fontRef idx="minor">
+              <a:schemeClr val="tx1"/>
+            </a:fontRef>
+          </p:style>
+        </p:cxnSp>
+        <p:cxnSp>
+          <p:nvCxnSpPr>
+            <p:cNvPr id="34" name="Straight Arrow Connector 33">
+              <a:extLst>
+                <a:ext uri="{FF2B5EF4-FFF2-40B4-BE49-F238E27FC236}">
+                  <a16:creationId xmlns:a16="http://schemas.microsoft.com/office/drawing/2014/main" id="{37DF3DD8-13E3-D620-B389-F58FC4C0B754}"/>
+                </a:ext>
+              </a:extLst>
+            </p:cNvPr>
+            <p:cNvCxnSpPr>
+              <a:cxnSpLocks/>
+            </p:cNvCxnSpPr>
+            <p:nvPr/>
+          </p:nvCxnSpPr>
+          <p:spPr>
+            <a:xfrm>
+              <a:off x="7497705" y="5457329"/>
+              <a:ext cx="719486" cy="0"/>
+            </a:xfrm>
+            <a:prstGeom prst="straightConnector1">
+              <a:avLst/>
+            </a:prstGeom>
+            <a:ln>
+              <a:tailEnd type="triangle"/>
+            </a:ln>
+          </p:spPr>
+          <p:style>
+            <a:lnRef idx="2">
+              <a:schemeClr val="accent1"/>
+            </a:lnRef>
+            <a:fillRef idx="0">
+              <a:schemeClr val="accent1"/>
+            </a:fillRef>
+            <a:effectRef idx="1">
+              <a:schemeClr val="accent1"/>
+            </a:effectRef>
+            <a:fontRef idx="minor">
+              <a:schemeClr val="tx1"/>
+            </a:fontRef>
+          </p:style>
+        </p:cxnSp>
+        <p:cxnSp>
+          <p:nvCxnSpPr>
+            <p:cNvPr id="35" name="Straight Arrow Connector 34">
+              <a:extLst>
+                <a:ext uri="{FF2B5EF4-FFF2-40B4-BE49-F238E27FC236}">
+                  <a16:creationId xmlns:a16="http://schemas.microsoft.com/office/drawing/2014/main" id="{58AFB2DD-6CC8-644C-DF58-D17FAB9B90B7}"/>
+                </a:ext>
+              </a:extLst>
+            </p:cNvPr>
+            <p:cNvCxnSpPr>
+              <a:cxnSpLocks/>
+            </p:cNvCxnSpPr>
+            <p:nvPr/>
+          </p:nvCxnSpPr>
+          <p:spPr>
+            <a:xfrm>
+              <a:off x="9415371" y="5457329"/>
+              <a:ext cx="719486" cy="0"/>
+            </a:xfrm>
+            <a:prstGeom prst="straightConnector1">
+              <a:avLst/>
+            </a:prstGeom>
+            <a:ln>
+              <a:tailEnd type="triangle"/>
+            </a:ln>
+          </p:spPr>
+          <p:style>
+            <a:lnRef idx="2">
+              <a:schemeClr val="accent1"/>
+            </a:lnRef>
+            <a:fillRef idx="0">
+              <a:schemeClr val="accent1"/>
+            </a:fillRef>
+            <a:effectRef idx="1">
+              <a:schemeClr val="accent1"/>
+            </a:effectRef>
+            <a:fontRef idx="minor">
+              <a:schemeClr val="tx1"/>
+            </a:fontRef>
+          </p:style>
+        </p:cxnSp>
+        <p:cxnSp>
+          <p:nvCxnSpPr>
+            <p:cNvPr id="36" name="Straight Arrow Connector 35">
+              <a:extLst>
+                <a:ext uri="{FF2B5EF4-FFF2-40B4-BE49-F238E27FC236}">
+                  <a16:creationId xmlns:a16="http://schemas.microsoft.com/office/drawing/2014/main" id="{4CD21539-DF5F-AA73-1F70-6B2141D76A10}"/>
+                </a:ext>
+              </a:extLst>
+            </p:cNvPr>
+            <p:cNvCxnSpPr>
+              <a:cxnSpLocks/>
+            </p:cNvCxnSpPr>
+            <p:nvPr/>
+          </p:nvCxnSpPr>
+          <p:spPr>
+            <a:xfrm>
+              <a:off x="2096342" y="5457329"/>
+              <a:ext cx="719486" cy="0"/>
+            </a:xfrm>
+            <a:prstGeom prst="straightConnector1">
+              <a:avLst/>
+            </a:prstGeom>
+            <a:ln>
+              <a:tailEnd type="triangle"/>
+            </a:ln>
+          </p:spPr>
+          <p:style>
+            <a:lnRef idx="2">
+              <a:schemeClr val="accent1"/>
+            </a:lnRef>
+            <a:fillRef idx="0">
+              <a:schemeClr val="accent1"/>
+            </a:fillRef>
+            <a:effectRef idx="1">
+              <a:schemeClr val="accent1"/>
+            </a:effectRef>
+            <a:fontRef idx="minor">
+              <a:schemeClr val="tx1"/>
+            </a:fontRef>
+          </p:style>
+        </p:cxnSp>
+        <p:sp>
+          <p:nvSpPr>
+            <p:cNvPr id="37" name="Oval 36">
+              <a:extLst>
+                <a:ext uri="{FF2B5EF4-FFF2-40B4-BE49-F238E27FC236}">
+                  <a16:creationId xmlns:a16="http://schemas.microsoft.com/office/drawing/2014/main" id="{189C351A-239B-E312-C213-822FF3959A1B}"/>
+                </a:ext>
+              </a:extLst>
+            </p:cNvPr>
+            <p:cNvSpPr/>
+            <p:nvPr/>
+          </p:nvSpPr>
+          <p:spPr>
+            <a:xfrm>
+              <a:off x="1920469" y="5364996"/>
+              <a:ext cx="184666" cy="184666"/>
+            </a:xfrm>
+            <a:prstGeom prst="ellipse">
+              <a:avLst/>
+            </a:prstGeom>
+            <a:noFill/>
+          </p:spPr>
+          <p:style>
+            <a:lnRef idx="2">
+              <a:schemeClr val="accent1">
+                <a:shade val="15000"/>
+              </a:schemeClr>
+            </a:lnRef>
+            <a:fillRef idx="1">
+              <a:schemeClr val="accent1"/>
+            </a:fillRef>
+            <a:effectRef idx="0">
+              <a:schemeClr val="accent1"/>
+            </a:effectRef>
+            <a:fontRef idx="minor">
+              <a:schemeClr val="lt1"/>
+            </a:fontRef>
+          </p:style>
+          <p:txBody>
+            <a:bodyPr rtlCol="0" anchor="ctr"/>
+            <a:lstStyle/>
+            <a:p>
+              <a:pPr algn="ctr"/>
+              <a:endParaRPr lang="en-US"/>
+            </a:p>
+          </p:txBody>
+        </p:sp>
+        <p:sp>
+          <p:nvSpPr>
+            <p:cNvPr id="38" name="Oval 37">
+              <a:extLst>
+                <a:ext uri="{FF2B5EF4-FFF2-40B4-BE49-F238E27FC236}">
+                  <a16:creationId xmlns:a16="http://schemas.microsoft.com/office/drawing/2014/main" id="{466F3E4F-F1CA-B3F1-6390-989F57D27919}"/>
+                </a:ext>
+              </a:extLst>
+            </p:cNvPr>
+            <p:cNvSpPr/>
+            <p:nvPr/>
+          </p:nvSpPr>
+          <p:spPr>
+            <a:xfrm>
+              <a:off x="10136813" y="5364996"/>
+              <a:ext cx="184666" cy="184666"/>
+            </a:xfrm>
+            <a:prstGeom prst="ellipse">
+              <a:avLst/>
+            </a:prstGeom>
+            <a:noFill/>
+          </p:spPr>
+          <p:style>
+            <a:lnRef idx="2">
+              <a:schemeClr val="accent1">
+                <a:shade val="15000"/>
+              </a:schemeClr>
+            </a:lnRef>
+            <a:fillRef idx="1">
+              <a:schemeClr val="accent1"/>
+            </a:fillRef>
+            <a:effectRef idx="0">
+              <a:schemeClr val="accent1"/>
+            </a:effectRef>
+            <a:fontRef idx="minor">
+              <a:schemeClr val="lt1"/>
+            </a:fontRef>
+          </p:style>
+          <p:txBody>
+            <a:bodyPr rtlCol="0" anchor="ctr"/>
+            <a:lstStyle/>
+            <a:p>
+              <a:pPr algn="ctr"/>
+              <a:endParaRPr lang="en-US"/>
+            </a:p>
+          </p:txBody>
+        </p:sp>
+        <mc:AlternateContent xmlns:mc="http://schemas.openxmlformats.org/markup-compatibility/2006">
+          <mc:Choice xmlns:a14="http://schemas.microsoft.com/office/drawing/2010/main" Requires="a14">
+            <p:sp>
+              <p:nvSpPr>
+                <p:cNvPr id="39" name="TextBox 38">
+                  <a:extLst>
+                    <a:ext uri="{FF2B5EF4-FFF2-40B4-BE49-F238E27FC236}">
+                      <a16:creationId xmlns:a16="http://schemas.microsoft.com/office/drawing/2014/main" id="{07A281CA-2E1E-3BF9-5DCB-90C4C9D1A1AB}"/>
+                    </a:ext>
+                  </a:extLst>
+                </p:cNvPr>
+                <p:cNvSpPr txBox="1"/>
+                <p:nvPr/>
+              </p:nvSpPr>
+              <p:spPr>
+                <a:xfrm>
+                  <a:off x="1239361" y="5272663"/>
+                  <a:ext cx="694421" cy="369332"/>
+                </a:xfrm>
+                <a:prstGeom prst="rect">
+                  <a:avLst/>
+                </a:prstGeom>
+                <a:noFill/>
+              </p:spPr>
+              <p:txBody>
+                <a:bodyPr wrap="none" rtlCol="0">
+                  <a:spAutoFit/>
+                </a:bodyPr>
+                <a:lstStyle/>
+                <a:p>
+                  <a14:m>
+                    <m:oMathPara xmlns:m="http://schemas.openxmlformats.org/officeDocument/2006/math">
+                      <m:oMathParaPr>
+                        <m:jc m:val="centerGroup"/>
+                      </m:oMathParaPr>
+                      <m:oMath xmlns:m="http://schemas.openxmlformats.org/officeDocument/2006/math">
+                        <m:r>
+                          <a:rPr lang="en-GB" b="0" i="1" smtClean="0">
+                            <a:latin typeface="Cambria Math" panose="02040503050406030204" pitchFamily="18" charset="0"/>
+                          </a:rPr>
+                          <m:t>𝑋</m:t>
+                        </m:r>
+                        <m:r>
+                          <a:rPr lang="en-GB" b="0" i="1" smtClean="0">
+                            <a:latin typeface="Cambria Math" panose="02040503050406030204" pitchFamily="18" charset="0"/>
+                          </a:rPr>
+                          <m:t>(</m:t>
+                        </m:r>
+                        <m:r>
+                          <a:rPr lang="en-GB" b="0" i="1" smtClean="0">
+                            <a:latin typeface="Cambria Math" panose="02040503050406030204" pitchFamily="18" charset="0"/>
+                          </a:rPr>
+                          <m:t>𝑧</m:t>
+                        </m:r>
+                        <m:r>
+                          <a:rPr lang="en-GB" b="0" i="1" smtClean="0">
+                            <a:latin typeface="Cambria Math" panose="02040503050406030204" pitchFamily="18" charset="0"/>
+                          </a:rPr>
+                          <m:t>)</m:t>
+                        </m:r>
+                      </m:oMath>
+                    </m:oMathPara>
+                  </a14:m>
+                  <a:endParaRPr lang="en-US" dirty="0"/>
+                </a:p>
+              </p:txBody>
+            </p:sp>
+          </mc:Choice>
+          <mc:Fallback>
+            <p:sp>
+              <p:nvSpPr>
+                <p:cNvPr id="39" name="TextBox 38">
+                  <a:extLst>
+                    <a:ext uri="{FF2B5EF4-FFF2-40B4-BE49-F238E27FC236}">
+                      <a16:creationId xmlns:a16="http://schemas.microsoft.com/office/drawing/2014/main" id="{07A281CA-2E1E-3BF9-5DCB-90C4C9D1A1AB}"/>
+                    </a:ext>
+                  </a:extLst>
+                </p:cNvPr>
+                <p:cNvSpPr txBox="1">
+                  <a:spLocks noRot="1" noChangeAspect="1" noMove="1" noResize="1" noEditPoints="1" noAdjustHandles="1" noChangeArrowheads="1" noChangeShapeType="1" noTextEdit="1"/>
+                </p:cNvSpPr>
+                <p:nvPr/>
+              </p:nvSpPr>
+              <p:spPr>
+                <a:xfrm>
+                  <a:off x="1239361" y="5272663"/>
+                  <a:ext cx="694421" cy="369332"/>
+                </a:xfrm>
+                <a:prstGeom prst="rect">
+                  <a:avLst/>
+                </a:prstGeom>
+                <a:blipFill>
+                  <a:blip r:embed="rId11"/>
+                  <a:stretch>
+                    <a:fillRect b="-13333"/>
+                  </a:stretch>
+                </a:blipFill>
+              </p:spPr>
+              <p:txBody>
+                <a:bodyPr/>
+                <a:lstStyle/>
+                <a:p>
+                  <a:r>
+                    <a:rPr lang="en-US">
+                      <a:noFill/>
+                    </a:rPr>
+                    <a:t> </a:t>
+                  </a:r>
+                </a:p>
+              </p:txBody>
+            </p:sp>
+          </mc:Fallback>
+        </mc:AlternateContent>
+        <mc:AlternateContent xmlns:mc="http://schemas.openxmlformats.org/markup-compatibility/2006">
+          <mc:Choice xmlns:a14="http://schemas.microsoft.com/office/drawing/2010/main" Requires="a14">
+            <p:sp>
+              <p:nvSpPr>
+                <p:cNvPr id="40" name="TextBox 39">
+                  <a:extLst>
+                    <a:ext uri="{FF2B5EF4-FFF2-40B4-BE49-F238E27FC236}">
+                      <a16:creationId xmlns:a16="http://schemas.microsoft.com/office/drawing/2014/main" id="{481D653C-7112-EB59-E399-7C292C07EC77}"/>
+                    </a:ext>
+                  </a:extLst>
+                </p:cNvPr>
+                <p:cNvSpPr txBox="1"/>
+                <p:nvPr/>
+              </p:nvSpPr>
+              <p:spPr>
+                <a:xfrm>
+                  <a:off x="10266341" y="5272663"/>
+                  <a:ext cx="694421" cy="369332"/>
+                </a:xfrm>
+                <a:prstGeom prst="rect">
+                  <a:avLst/>
+                </a:prstGeom>
+                <a:noFill/>
+              </p:spPr>
+              <p:txBody>
+                <a:bodyPr wrap="none" rtlCol="0">
+                  <a:spAutoFit/>
+                </a:bodyPr>
+                <a:lstStyle/>
+                <a:p>
+                  <a14:m>
+                    <m:oMathPara xmlns:m="http://schemas.openxmlformats.org/officeDocument/2006/math">
+                      <m:oMathParaPr>
+                        <m:jc m:val="centerGroup"/>
+                      </m:oMathParaPr>
+                      <m:oMath xmlns:m="http://schemas.openxmlformats.org/officeDocument/2006/math">
+                        <m:r>
+                          <a:rPr lang="en-GB" b="0" i="1" smtClean="0">
+                            <a:latin typeface="Cambria Math" panose="02040503050406030204" pitchFamily="18" charset="0"/>
+                          </a:rPr>
+                          <m:t>𝑌</m:t>
+                        </m:r>
+                        <m:r>
+                          <a:rPr lang="en-GB" b="0" i="1" smtClean="0">
+                            <a:latin typeface="Cambria Math" panose="02040503050406030204" pitchFamily="18" charset="0"/>
+                          </a:rPr>
+                          <m:t>(</m:t>
+                        </m:r>
+                        <m:r>
+                          <a:rPr lang="en-GB" b="0" i="1" smtClean="0">
+                            <a:latin typeface="Cambria Math" panose="02040503050406030204" pitchFamily="18" charset="0"/>
+                          </a:rPr>
+                          <m:t>𝑧</m:t>
+                        </m:r>
+                        <m:r>
+                          <a:rPr lang="en-GB" b="0" i="1" smtClean="0">
+                            <a:latin typeface="Cambria Math" panose="02040503050406030204" pitchFamily="18" charset="0"/>
+                          </a:rPr>
+                          <m:t>)</m:t>
+                        </m:r>
+                      </m:oMath>
+                    </m:oMathPara>
+                  </a14:m>
+                  <a:endParaRPr lang="en-US" dirty="0"/>
+                </a:p>
+              </p:txBody>
+            </p:sp>
+          </mc:Choice>
+          <mc:Fallback>
+            <p:sp>
+              <p:nvSpPr>
+                <p:cNvPr id="40" name="TextBox 39">
+                  <a:extLst>
+                    <a:ext uri="{FF2B5EF4-FFF2-40B4-BE49-F238E27FC236}">
+                      <a16:creationId xmlns:a16="http://schemas.microsoft.com/office/drawing/2014/main" id="{481D653C-7112-EB59-E399-7C292C07EC77}"/>
+                    </a:ext>
+                  </a:extLst>
+                </p:cNvPr>
+                <p:cNvSpPr txBox="1">
+                  <a:spLocks noRot="1" noChangeAspect="1" noMove="1" noResize="1" noEditPoints="1" noAdjustHandles="1" noChangeArrowheads="1" noChangeShapeType="1" noTextEdit="1"/>
+                </p:cNvSpPr>
+                <p:nvPr/>
+              </p:nvSpPr>
+              <p:spPr>
+                <a:xfrm>
+                  <a:off x="10266341" y="5272663"/>
+                  <a:ext cx="694421" cy="369332"/>
+                </a:xfrm>
+                <a:prstGeom prst="rect">
+                  <a:avLst/>
+                </a:prstGeom>
+                <a:blipFill>
+                  <a:blip r:embed="rId12"/>
+                  <a:stretch>
+                    <a:fillRect b="-13333"/>
+                  </a:stretch>
+                </a:blipFill>
+              </p:spPr>
+              <p:txBody>
+                <a:bodyPr/>
+                <a:lstStyle/>
+                <a:p>
+                  <a:r>
+                    <a:rPr lang="en-US">
+                      <a:noFill/>
+                    </a:rPr>
+                    <a:t> </a:t>
+                  </a:r>
+                </a:p>
+              </p:txBody>
+            </p:sp>
+          </mc:Fallback>
+        </mc:AlternateContent>
+        <p:cxnSp>
+          <p:nvCxnSpPr>
+            <p:cNvPr id="43" name="Straight Connector 42">
+              <a:extLst>
+                <a:ext uri="{FF2B5EF4-FFF2-40B4-BE49-F238E27FC236}">
+                  <a16:creationId xmlns:a16="http://schemas.microsoft.com/office/drawing/2014/main" id="{6C6CECCB-B19D-9AB2-753D-39377A76C167}"/>
+                </a:ext>
+              </a:extLst>
+            </p:cNvPr>
+            <p:cNvCxnSpPr>
+              <a:cxnSpLocks/>
+            </p:cNvCxnSpPr>
+            <p:nvPr/>
+          </p:nvCxnSpPr>
+          <p:spPr>
+            <a:xfrm>
+              <a:off x="6724732" y="5459789"/>
+              <a:ext cx="685061" cy="0"/>
+            </a:xfrm>
+            <a:prstGeom prst="line">
+              <a:avLst/>
+            </a:prstGeom>
+            <a:ln>
+              <a:prstDash val="sysDash"/>
+            </a:ln>
+          </p:spPr>
+          <p:style>
+            <a:lnRef idx="2">
+              <a:schemeClr val="accent1"/>
+            </a:lnRef>
+            <a:fillRef idx="0">
+              <a:schemeClr val="accent1"/>
+            </a:fillRef>
+            <a:effectRef idx="1">
+              <a:schemeClr val="accent1"/>
+            </a:effectRef>
+            <a:fontRef idx="minor">
+              <a:schemeClr val="tx1"/>
+            </a:fontRef>
+          </p:style>
+        </p:cxnSp>
       </p:grpSp>
     </p:spTree>
     <p:extLst>

</xml_diff>

<commit_message>
Check point 18:35 2024-04-28
</commit_message>
<xml_diff>
--- a/filter_design/pictures/picturespptx.pptx
+++ b/filter_design/pictures/picturespptx.pptx
@@ -6,6 +6,7 @@
   </p:sldMasterIdLst>
   <p:sldIdLst>
     <p:sldId id="257" r:id="rId2"/>
+    <p:sldId id="258" r:id="rId3"/>
   </p:sldIdLst>
   <p:sldSz cx="12192000" cy="6858000"/>
   <p:notesSz cx="6858000" cy="9144000"/>
@@ -4648,8 +4649,8 @@
               </a:p>
             </p:txBody>
           </p:sp>
-          <mc:AlternateContent xmlns:mc="http://schemas.openxmlformats.org/markup-compatibility/2006">
-            <mc:Choice xmlns:a14="http://schemas.microsoft.com/office/drawing/2010/main" Requires="a14">
+          <mc:AlternateContent xmlns:mc="http://schemas.openxmlformats.org/markup-compatibility/2006" xmlns:a14="http://schemas.microsoft.com/office/drawing/2010/main">
+            <mc:Choice Requires="a14">
               <p:sp>
                 <p:nvSpPr>
                   <p:cNvPr id="6" name="TextBox 5">
@@ -4678,6 +4679,7 @@
                   </a:bodyPr>
                   <a:lstStyle/>
                   <a:p>
+                    <a:pPr/>
                     <a14:m>
                       <m:oMathPara xmlns:m="http://schemas.openxmlformats.org/officeDocument/2006/math">
                         <m:oMathParaPr>
@@ -4738,7 +4740,7 @@
                 </p:txBody>
               </p:sp>
             </mc:Choice>
-            <mc:Fallback>
+            <mc:Fallback xmlns="">
               <p:sp>
                 <p:nvSpPr>
                   <p:cNvPr id="6" name="TextBox 5">
@@ -4851,8 +4853,8 @@
               </a:p>
             </p:txBody>
           </p:sp>
-          <mc:AlternateContent xmlns:mc="http://schemas.openxmlformats.org/markup-compatibility/2006">
-            <mc:Choice xmlns:a14="http://schemas.microsoft.com/office/drawing/2010/main" Requires="a14">
+          <mc:AlternateContent xmlns:mc="http://schemas.openxmlformats.org/markup-compatibility/2006" xmlns:a14="http://schemas.microsoft.com/office/drawing/2010/main">
+            <mc:Choice Requires="a14">
               <p:sp>
                 <p:nvSpPr>
                   <p:cNvPr id="11" name="TextBox 10">
@@ -4881,6 +4883,7 @@
                   </a:bodyPr>
                   <a:lstStyle/>
                   <a:p>
+                    <a:pPr/>
                     <a14:m>
                       <m:oMathPara xmlns:m="http://schemas.openxmlformats.org/officeDocument/2006/math">
                         <m:oMathParaPr>
@@ -4941,7 +4944,7 @@
                 </p:txBody>
               </p:sp>
             </mc:Choice>
-            <mc:Fallback>
+            <mc:Fallback xmlns="">
               <p:sp>
                 <p:nvSpPr>
                   <p:cNvPr id="11" name="TextBox 10">
@@ -5054,8 +5057,8 @@
               </a:p>
             </p:txBody>
           </p:sp>
-          <mc:AlternateContent xmlns:mc="http://schemas.openxmlformats.org/markup-compatibility/2006">
-            <mc:Choice xmlns:a14="http://schemas.microsoft.com/office/drawing/2010/main" Requires="a14">
+          <mc:AlternateContent xmlns:mc="http://schemas.openxmlformats.org/markup-compatibility/2006" xmlns:a14="http://schemas.microsoft.com/office/drawing/2010/main">
+            <mc:Choice Requires="a14">
               <p:sp>
                 <p:nvSpPr>
                   <p:cNvPr id="19" name="TextBox 18">
@@ -5084,6 +5087,7 @@
                   </a:bodyPr>
                   <a:lstStyle/>
                   <a:p>
+                    <a:pPr/>
                     <a14:m>
                       <m:oMathPara xmlns:m="http://schemas.openxmlformats.org/officeDocument/2006/math">
                         <m:oMathParaPr>
@@ -5144,7 +5148,7 @@
                 </p:txBody>
               </p:sp>
             </mc:Choice>
-            <mc:Fallback>
+            <mc:Fallback xmlns="">
               <p:sp>
                 <p:nvSpPr>
                   <p:cNvPr id="19" name="TextBox 18">
@@ -5489,8 +5493,8 @@
             </a:p>
           </p:txBody>
         </p:sp>
-        <mc:AlternateContent xmlns:mc="http://schemas.openxmlformats.org/markup-compatibility/2006">
-          <mc:Choice xmlns:a14="http://schemas.microsoft.com/office/drawing/2010/main" Requires="a14">
+        <mc:AlternateContent xmlns:mc="http://schemas.openxmlformats.org/markup-compatibility/2006" xmlns:a14="http://schemas.microsoft.com/office/drawing/2010/main">
+          <mc:Choice Requires="a14">
             <p:sp>
               <p:nvSpPr>
                 <p:cNvPr id="39" name="TextBox 38">
@@ -5519,6 +5523,7 @@
                 </a:bodyPr>
                 <a:lstStyle/>
                 <a:p>
+                  <a:pPr/>
                   <a14:m>
                     <m:oMathPara xmlns:m="http://schemas.openxmlformats.org/officeDocument/2006/math">
                       <m:oMathParaPr>
@@ -5557,7 +5562,7 @@
               </p:txBody>
             </p:sp>
           </mc:Choice>
-          <mc:Fallback>
+          <mc:Fallback xmlns="">
             <p:sp>
               <p:nvSpPr>
                 <p:cNvPr id="39" name="TextBox 38">
@@ -5602,8 +5607,8 @@
             </p:sp>
           </mc:Fallback>
         </mc:AlternateContent>
-        <mc:AlternateContent xmlns:mc="http://schemas.openxmlformats.org/markup-compatibility/2006">
-          <mc:Choice xmlns:a14="http://schemas.microsoft.com/office/drawing/2010/main" Requires="a14">
+        <mc:AlternateContent xmlns:mc="http://schemas.openxmlformats.org/markup-compatibility/2006" xmlns:a14="http://schemas.microsoft.com/office/drawing/2010/main">
+          <mc:Choice Requires="a14">
             <p:sp>
               <p:nvSpPr>
                 <p:cNvPr id="40" name="TextBox 39">
@@ -5632,6 +5637,7 @@
                 </a:bodyPr>
                 <a:lstStyle/>
                 <a:p>
+                  <a:pPr/>
                   <a14:m>
                     <m:oMathPara xmlns:m="http://schemas.openxmlformats.org/officeDocument/2006/math">
                       <m:oMathParaPr>
@@ -5670,7 +5676,7 @@
               </p:txBody>
             </p:sp>
           </mc:Choice>
-          <mc:Fallback>
+          <mc:Fallback xmlns="">
             <p:sp>
               <p:nvSpPr>
                 <p:cNvPr id="40" name="TextBox 39">
@@ -5761,6 +5767,1885 @@
     <p:extLst>
       <p:ext uri="{BB962C8B-B14F-4D97-AF65-F5344CB8AC3E}">
         <p14:creationId xmlns:p14="http://schemas.microsoft.com/office/powerpoint/2010/main" val="3083059815"/>
+      </p:ext>
+    </p:extLst>
+  </p:cSld>
+  <p:clrMapOvr>
+    <a:masterClrMapping/>
+  </p:clrMapOvr>
+</p:sld>
+</file>
+
+<file path=ppt/slides/slide2.xml><?xml version="1.0" encoding="utf-8"?>
+<p:sld xmlns:a="http://schemas.openxmlformats.org/drawingml/2006/main" xmlns:r="http://schemas.openxmlformats.org/officeDocument/2006/relationships" xmlns:p="http://schemas.openxmlformats.org/presentationml/2006/main">
+  <p:cSld>
+    <p:spTree>
+      <p:nvGrpSpPr>
+        <p:cNvPr id="1" name=""/>
+        <p:cNvGrpSpPr/>
+        <p:nvPr/>
+      </p:nvGrpSpPr>
+      <p:grpSpPr>
+        <a:xfrm>
+          <a:off x="0" y="0"/>
+          <a:ext cx="0" cy="0"/>
+          <a:chOff x="0" y="0"/>
+          <a:chExt cx="0" cy="0"/>
+        </a:xfrm>
+      </p:grpSpPr>
+      <p:grpSp>
+        <p:nvGrpSpPr>
+          <p:cNvPr id="52" name="Group 51">
+            <a:extLst>
+              <a:ext uri="{FF2B5EF4-FFF2-40B4-BE49-F238E27FC236}">
+                <a16:creationId xmlns:a16="http://schemas.microsoft.com/office/drawing/2014/main" id="{9FF3707F-8CBA-B0C2-0F1E-47E1B953357F}"/>
+              </a:ext>
+            </a:extLst>
+          </p:cNvPr>
+          <p:cNvGrpSpPr/>
+          <p:nvPr/>
+        </p:nvGrpSpPr>
+        <p:grpSpPr>
+          <a:xfrm>
+            <a:off x="2703957" y="676914"/>
+            <a:ext cx="6295961" cy="5661608"/>
+            <a:chOff x="1642412" y="950183"/>
+            <a:chExt cx="6295961" cy="5661608"/>
+          </a:xfrm>
+        </p:grpSpPr>
+        <p:grpSp>
+          <p:nvGrpSpPr>
+            <p:cNvPr id="4" name="Group 3">
+              <a:extLst>
+                <a:ext uri="{FF2B5EF4-FFF2-40B4-BE49-F238E27FC236}">
+                  <a16:creationId xmlns:a16="http://schemas.microsoft.com/office/drawing/2014/main" id="{53DF64EE-4405-A279-D3FB-3E8FB13DDE42}"/>
+                </a:ext>
+              </a:extLst>
+            </p:cNvPr>
+            <p:cNvGrpSpPr/>
+            <p:nvPr/>
+          </p:nvGrpSpPr>
+          <p:grpSpPr>
+            <a:xfrm>
+              <a:off x="3939501" y="3554287"/>
+              <a:ext cx="1198180" cy="861848"/>
+              <a:chOff x="7745268" y="4382814"/>
+              <a:chExt cx="1198180" cy="861848"/>
+            </a:xfrm>
+          </p:grpSpPr>
+          <p:sp>
+            <p:nvSpPr>
+              <p:cNvPr id="18" name="Rectangle 17">
+                <a:extLst>
+                  <a:ext uri="{FF2B5EF4-FFF2-40B4-BE49-F238E27FC236}">
+                    <a16:creationId xmlns:a16="http://schemas.microsoft.com/office/drawing/2014/main" id="{012EFA12-9EFE-2F82-9B40-446855A03D70}"/>
+                  </a:ext>
+                </a:extLst>
+              </p:cNvPr>
+              <p:cNvSpPr/>
+              <p:nvPr/>
+            </p:nvSpPr>
+            <p:spPr>
+              <a:xfrm>
+                <a:off x="7745268" y="4382814"/>
+                <a:ext cx="1198180" cy="861848"/>
+              </a:xfrm>
+              <a:prstGeom prst="rect">
+                <a:avLst/>
+              </a:prstGeom>
+              <a:noFill/>
+            </p:spPr>
+            <p:style>
+              <a:lnRef idx="2">
+                <a:schemeClr val="accent1">
+                  <a:shade val="15000"/>
+                </a:schemeClr>
+              </a:lnRef>
+              <a:fillRef idx="1">
+                <a:schemeClr val="accent1"/>
+              </a:fillRef>
+              <a:effectRef idx="0">
+                <a:schemeClr val="accent1"/>
+              </a:effectRef>
+              <a:fontRef idx="minor">
+                <a:schemeClr val="lt1"/>
+              </a:fontRef>
+            </p:style>
+            <p:txBody>
+              <a:bodyPr rtlCol="0" anchor="ctr"/>
+              <a:lstStyle/>
+              <a:p>
+                <a:pPr algn="ctr"/>
+                <a:endParaRPr lang="en-US"/>
+              </a:p>
+            </p:txBody>
+          </p:sp>
+          <mc:AlternateContent xmlns:mc="http://schemas.openxmlformats.org/markup-compatibility/2006" xmlns:a14="http://schemas.microsoft.com/office/drawing/2010/main">
+            <mc:Choice Requires="a14">
+              <p:sp>
+                <p:nvSpPr>
+                  <p:cNvPr id="19" name="TextBox 18">
+                    <a:extLst>
+                      <a:ext uri="{FF2B5EF4-FFF2-40B4-BE49-F238E27FC236}">
+                        <a16:creationId xmlns:a16="http://schemas.microsoft.com/office/drawing/2014/main" id="{91809DB9-7010-D296-59F2-9A2A194F752E}"/>
+                      </a:ext>
+                    </a:extLst>
+                  </p:cNvPr>
+                  <p:cNvSpPr txBox="1"/>
+                  <p:nvPr/>
+                </p:nvSpPr>
+                <p:spPr>
+                  <a:xfrm>
+                    <a:off x="7931424" y="4598331"/>
+                    <a:ext cx="825867" cy="646331"/>
+                  </a:xfrm>
+                  <a:prstGeom prst="rect">
+                    <a:avLst/>
+                  </a:prstGeom>
+                  <a:noFill/>
+                </p:spPr>
+                <p:txBody>
+                  <a:bodyPr wrap="none" rtlCol="0">
+                    <a:spAutoFit/>
+                  </a:bodyPr>
+                  <a:lstStyle/>
+                  <a:p>
+                    <a:pPr/>
+                    <a14:m>
+                      <m:oMathPara xmlns:m="http://schemas.openxmlformats.org/officeDocument/2006/math">
+                        <m:oMathParaPr>
+                          <m:jc m:val="centerGroup"/>
+                        </m:oMathParaPr>
+                        <m:oMath xmlns:m="http://schemas.openxmlformats.org/officeDocument/2006/math">
+                          <m:sSub>
+                            <m:sSubPr>
+                              <m:ctrlPr>
+                                <a:rPr lang="en-GB" b="0" i="1" smtClean="0">
+                                  <a:latin typeface="Cambria Math" panose="02040503050406030204" pitchFamily="18" charset="0"/>
+                                </a:rPr>
+                              </m:ctrlPr>
+                            </m:sSubPr>
+                            <m:e>
+                              <m:r>
+                                <a:rPr lang="en-GB" b="0" i="1" smtClean="0">
+                                  <a:latin typeface="Cambria Math" panose="02040503050406030204" pitchFamily="18" charset="0"/>
+                                </a:rPr>
+                                <m:t>𝐻</m:t>
+                              </m:r>
+                            </m:e>
+                            <m:sub>
+                              <m:r>
+                                <a:rPr lang="en-GB" b="0" i="1" smtClean="0">
+                                  <a:latin typeface="Cambria Math" panose="02040503050406030204" pitchFamily="18" charset="0"/>
+                                </a:rPr>
+                                <m:t>2</m:t>
+                              </m:r>
+                            </m:sub>
+                          </m:sSub>
+                          <m:r>
+                            <a:rPr lang="en-GB" b="0" i="1" smtClean="0">
+                              <a:latin typeface="Cambria Math" panose="02040503050406030204" pitchFamily="18" charset="0"/>
+                            </a:rPr>
+                            <m:t>(</m:t>
+                          </m:r>
+                          <m:r>
+                            <a:rPr lang="en-GB" b="0" i="1" smtClean="0">
+                              <a:latin typeface="Cambria Math" panose="02040503050406030204" pitchFamily="18" charset="0"/>
+                            </a:rPr>
+                            <m:t>𝑧</m:t>
+                          </m:r>
+                          <m:r>
+                            <a:rPr lang="en-GB" b="0" i="1" smtClean="0">
+                              <a:latin typeface="Cambria Math" panose="02040503050406030204" pitchFamily="18" charset="0"/>
+                            </a:rPr>
+                            <m:t>)</m:t>
+                          </m:r>
+                        </m:oMath>
+                      </m:oMathPara>
+                    </a14:m>
+                    <a:endParaRPr lang="en-GB" b="0" dirty="0"/>
+                  </a:p>
+                  <a:p>
+                    <a:endParaRPr lang="en-US" dirty="0"/>
+                  </a:p>
+                </p:txBody>
+              </p:sp>
+            </mc:Choice>
+            <mc:Fallback xmlns="">
+              <p:sp>
+                <p:nvSpPr>
+                  <p:cNvPr id="11" name="TextBox 10">
+                    <a:extLst>
+                      <a:ext uri="{FF2B5EF4-FFF2-40B4-BE49-F238E27FC236}">
+                        <a16:creationId xmlns:a16="http://schemas.microsoft.com/office/drawing/2014/main" id="{BE9E1A7B-0FA5-5646-DA35-F0D0F8014852}"/>
+                      </a:ext>
+                    </a:extLst>
+                  </p:cNvPr>
+                  <p:cNvSpPr txBox="1">
+                    <a:spLocks noRot="1" noChangeAspect="1" noMove="1" noResize="1" noEditPoints="1" noAdjustHandles="1" noChangeArrowheads="1" noChangeShapeType="1" noTextEdit="1"/>
+                  </p:cNvSpPr>
+                  <p:nvPr/>
+                </p:nvSpPr>
+                <p:spPr>
+                  <a:xfrm>
+                    <a:off x="7931424" y="4598331"/>
+                    <a:ext cx="825867" cy="646331"/>
+                  </a:xfrm>
+                  <a:prstGeom prst="rect">
+                    <a:avLst/>
+                  </a:prstGeom>
+                  <a:blipFill>
+                    <a:blip r:embed="rId9"/>
+                    <a:stretch>
+                      <a:fillRect/>
+                    </a:stretch>
+                  </a:blipFill>
+                </p:spPr>
+                <p:txBody>
+                  <a:bodyPr/>
+                  <a:lstStyle/>
+                  <a:p>
+                    <a:r>
+                      <a:rPr lang="en-US">
+                        <a:noFill/>
+                      </a:rPr>
+                      <a:t> </a:t>
+                    </a:r>
+                  </a:p>
+                </p:txBody>
+              </p:sp>
+            </mc:Fallback>
+          </mc:AlternateContent>
+        </p:grpSp>
+        <p:grpSp>
+          <p:nvGrpSpPr>
+            <p:cNvPr id="5" name="Group 4">
+              <a:extLst>
+                <a:ext uri="{FF2B5EF4-FFF2-40B4-BE49-F238E27FC236}">
+                  <a16:creationId xmlns:a16="http://schemas.microsoft.com/office/drawing/2014/main" id="{A8223FEA-7E22-D13D-17A3-25053AFB8B60}"/>
+                </a:ext>
+              </a:extLst>
+            </p:cNvPr>
+            <p:cNvGrpSpPr/>
+            <p:nvPr/>
+          </p:nvGrpSpPr>
+          <p:grpSpPr>
+            <a:xfrm>
+              <a:off x="3939501" y="5749943"/>
+              <a:ext cx="1198180" cy="861848"/>
+              <a:chOff x="10426261" y="4382814"/>
+              <a:chExt cx="1198180" cy="861848"/>
+            </a:xfrm>
+          </p:grpSpPr>
+          <p:sp>
+            <p:nvSpPr>
+              <p:cNvPr id="16" name="Rectangle 15">
+                <a:extLst>
+                  <a:ext uri="{FF2B5EF4-FFF2-40B4-BE49-F238E27FC236}">
+                    <a16:creationId xmlns:a16="http://schemas.microsoft.com/office/drawing/2014/main" id="{2170741C-9F0F-9A63-C4B2-EA897E321336}"/>
+                  </a:ext>
+                </a:extLst>
+              </p:cNvPr>
+              <p:cNvSpPr/>
+              <p:nvPr/>
+            </p:nvSpPr>
+            <p:spPr>
+              <a:xfrm>
+                <a:off x="10426261" y="4382814"/>
+                <a:ext cx="1198180" cy="861848"/>
+              </a:xfrm>
+              <a:prstGeom prst="rect">
+                <a:avLst/>
+              </a:prstGeom>
+              <a:noFill/>
+            </p:spPr>
+            <p:style>
+              <a:lnRef idx="2">
+                <a:schemeClr val="accent1">
+                  <a:shade val="15000"/>
+                </a:schemeClr>
+              </a:lnRef>
+              <a:fillRef idx="1">
+                <a:schemeClr val="accent1"/>
+              </a:fillRef>
+              <a:effectRef idx="0">
+                <a:schemeClr val="accent1"/>
+              </a:effectRef>
+              <a:fontRef idx="minor">
+                <a:schemeClr val="lt1"/>
+              </a:fontRef>
+            </p:style>
+            <p:txBody>
+              <a:bodyPr rtlCol="0" anchor="ctr"/>
+              <a:lstStyle/>
+              <a:p>
+                <a:pPr algn="ctr"/>
+                <a:endParaRPr lang="en-US"/>
+              </a:p>
+            </p:txBody>
+          </p:sp>
+          <mc:AlternateContent xmlns:mc="http://schemas.openxmlformats.org/markup-compatibility/2006" xmlns:a14="http://schemas.microsoft.com/office/drawing/2010/main">
+            <mc:Choice Requires="a14">
+              <p:sp>
+                <p:nvSpPr>
+                  <p:cNvPr id="17" name="TextBox 16">
+                    <a:extLst>
+                      <a:ext uri="{FF2B5EF4-FFF2-40B4-BE49-F238E27FC236}">
+                        <a16:creationId xmlns:a16="http://schemas.microsoft.com/office/drawing/2014/main" id="{E22FAD34-A9F1-6865-77CE-5E55F27CDA9D}"/>
+                      </a:ext>
+                    </a:extLst>
+                  </p:cNvPr>
+                  <p:cNvSpPr txBox="1"/>
+                  <p:nvPr/>
+                </p:nvSpPr>
+                <p:spPr>
+                  <a:xfrm>
+                    <a:off x="10627101" y="4598331"/>
+                    <a:ext cx="834780" cy="646331"/>
+                  </a:xfrm>
+                  <a:prstGeom prst="rect">
+                    <a:avLst/>
+                  </a:prstGeom>
+                  <a:noFill/>
+                </p:spPr>
+                <p:txBody>
+                  <a:bodyPr wrap="none" rtlCol="0">
+                    <a:spAutoFit/>
+                  </a:bodyPr>
+                  <a:lstStyle/>
+                  <a:p>
+                    <a:pPr/>
+                    <a14:m>
+                      <m:oMathPara xmlns:m="http://schemas.openxmlformats.org/officeDocument/2006/math">
+                        <m:oMathParaPr>
+                          <m:jc m:val="centerGroup"/>
+                        </m:oMathParaPr>
+                        <m:oMath xmlns:m="http://schemas.openxmlformats.org/officeDocument/2006/math">
+                          <m:sSub>
+                            <m:sSubPr>
+                              <m:ctrlPr>
+                                <a:rPr lang="en-GB" b="0" i="1" smtClean="0">
+                                  <a:latin typeface="Cambria Math" panose="02040503050406030204" pitchFamily="18" charset="0"/>
+                                </a:rPr>
+                              </m:ctrlPr>
+                            </m:sSubPr>
+                            <m:e>
+                              <m:r>
+                                <a:rPr lang="en-GB" b="0" i="1" smtClean="0">
+                                  <a:latin typeface="Cambria Math" panose="02040503050406030204" pitchFamily="18" charset="0"/>
+                                </a:rPr>
+                                <m:t>𝐻</m:t>
+                              </m:r>
+                            </m:e>
+                            <m:sub>
+                              <m:r>
+                                <a:rPr lang="en-GB" b="0" i="1" smtClean="0">
+                                  <a:latin typeface="Cambria Math" panose="02040503050406030204" pitchFamily="18" charset="0"/>
+                                </a:rPr>
+                                <m:t>𝑅</m:t>
+                              </m:r>
+                            </m:sub>
+                          </m:sSub>
+                          <m:r>
+                            <a:rPr lang="en-GB" b="0" i="1" smtClean="0">
+                              <a:latin typeface="Cambria Math" panose="02040503050406030204" pitchFamily="18" charset="0"/>
+                            </a:rPr>
+                            <m:t>(</m:t>
+                          </m:r>
+                          <m:r>
+                            <a:rPr lang="en-GB" b="0" i="1" smtClean="0">
+                              <a:latin typeface="Cambria Math" panose="02040503050406030204" pitchFamily="18" charset="0"/>
+                            </a:rPr>
+                            <m:t>𝑧</m:t>
+                          </m:r>
+                          <m:r>
+                            <a:rPr lang="en-GB" b="0" i="1" smtClean="0">
+                              <a:latin typeface="Cambria Math" panose="02040503050406030204" pitchFamily="18" charset="0"/>
+                            </a:rPr>
+                            <m:t>)</m:t>
+                          </m:r>
+                        </m:oMath>
+                      </m:oMathPara>
+                    </a14:m>
+                    <a:endParaRPr lang="en-GB" b="0" dirty="0"/>
+                  </a:p>
+                  <a:p>
+                    <a:endParaRPr lang="en-US" dirty="0"/>
+                  </a:p>
+                </p:txBody>
+              </p:sp>
+            </mc:Choice>
+            <mc:Fallback xmlns="">
+              <p:sp>
+                <p:nvSpPr>
+                  <p:cNvPr id="19" name="TextBox 18">
+                    <a:extLst>
+                      <a:ext uri="{FF2B5EF4-FFF2-40B4-BE49-F238E27FC236}">
+                        <a16:creationId xmlns:a16="http://schemas.microsoft.com/office/drawing/2014/main" id="{EF101761-B23C-EBB9-3748-6CD6ADEDBF3A}"/>
+                      </a:ext>
+                    </a:extLst>
+                  </p:cNvPr>
+                  <p:cNvSpPr txBox="1">
+                    <a:spLocks noRot="1" noChangeAspect="1" noMove="1" noResize="1" noEditPoints="1" noAdjustHandles="1" noChangeArrowheads="1" noChangeShapeType="1" noTextEdit="1"/>
+                  </p:cNvSpPr>
+                  <p:nvPr/>
+                </p:nvSpPr>
+                <p:spPr>
+                  <a:xfrm>
+                    <a:off x="10627101" y="4598331"/>
+                    <a:ext cx="834780" cy="646331"/>
+                  </a:xfrm>
+                  <a:prstGeom prst="rect">
+                    <a:avLst/>
+                  </a:prstGeom>
+                  <a:blipFill>
+                    <a:blip r:embed="rId10"/>
+                    <a:stretch>
+                      <a:fillRect/>
+                    </a:stretch>
+                  </a:blipFill>
+                </p:spPr>
+                <p:txBody>
+                  <a:bodyPr/>
+                  <a:lstStyle/>
+                  <a:p>
+                    <a:r>
+                      <a:rPr lang="en-US">
+                        <a:noFill/>
+                      </a:rPr>
+                      <a:t> </a:t>
+                    </a:r>
+                  </a:p>
+                </p:txBody>
+              </p:sp>
+            </mc:Fallback>
+          </mc:AlternateContent>
+        </p:grpSp>
+        <p:cxnSp>
+          <p:nvCxnSpPr>
+            <p:cNvPr id="7" name="Straight Arrow Connector 6">
+              <a:extLst>
+                <a:ext uri="{FF2B5EF4-FFF2-40B4-BE49-F238E27FC236}">
+                  <a16:creationId xmlns:a16="http://schemas.microsoft.com/office/drawing/2014/main" id="{B3F3403F-1DB7-ECAB-9ED7-BC4964BDBE2E}"/>
+                </a:ext>
+              </a:extLst>
+            </p:cNvPr>
+            <p:cNvCxnSpPr>
+              <a:cxnSpLocks/>
+            </p:cNvCxnSpPr>
+            <p:nvPr/>
+          </p:nvCxnSpPr>
+          <p:spPr>
+            <a:xfrm>
+              <a:off x="3220015" y="6180867"/>
+              <a:ext cx="719486" cy="0"/>
+            </a:xfrm>
+            <a:prstGeom prst="straightConnector1">
+              <a:avLst/>
+            </a:prstGeom>
+            <a:ln>
+              <a:tailEnd type="triangle"/>
+            </a:ln>
+          </p:spPr>
+          <p:style>
+            <a:lnRef idx="2">
+              <a:schemeClr val="accent1"/>
+            </a:lnRef>
+            <a:fillRef idx="0">
+              <a:schemeClr val="accent1"/>
+            </a:fillRef>
+            <a:effectRef idx="1">
+              <a:schemeClr val="accent1"/>
+            </a:effectRef>
+            <a:fontRef idx="minor">
+              <a:schemeClr val="tx1"/>
+            </a:fontRef>
+          </p:style>
+        </p:cxnSp>
+        <p:cxnSp>
+          <p:nvCxnSpPr>
+            <p:cNvPr id="8" name="Straight Arrow Connector 7">
+              <a:extLst>
+                <a:ext uri="{FF2B5EF4-FFF2-40B4-BE49-F238E27FC236}">
+                  <a16:creationId xmlns:a16="http://schemas.microsoft.com/office/drawing/2014/main" id="{B14A6283-18C1-C35C-6147-C315B0CC7ECB}"/>
+                </a:ext>
+              </a:extLst>
+            </p:cNvPr>
+            <p:cNvCxnSpPr>
+              <a:cxnSpLocks/>
+            </p:cNvCxnSpPr>
+            <p:nvPr/>
+          </p:nvCxnSpPr>
+          <p:spPr>
+            <a:xfrm>
+              <a:off x="5137681" y="6180867"/>
+              <a:ext cx="955967" cy="0"/>
+            </a:xfrm>
+            <a:prstGeom prst="straightConnector1">
+              <a:avLst/>
+            </a:prstGeom>
+            <a:ln>
+              <a:headEnd type="none" w="med" len="med"/>
+              <a:tailEnd type="none" w="med" len="med"/>
+            </a:ln>
+          </p:spPr>
+          <p:style>
+            <a:lnRef idx="2">
+              <a:schemeClr val="accent1"/>
+            </a:lnRef>
+            <a:fillRef idx="0">
+              <a:schemeClr val="accent1"/>
+            </a:fillRef>
+            <a:effectRef idx="1">
+              <a:schemeClr val="accent1"/>
+            </a:effectRef>
+            <a:fontRef idx="minor">
+              <a:schemeClr val="tx1"/>
+            </a:fontRef>
+          </p:style>
+        </p:cxnSp>
+        <p:grpSp>
+          <p:nvGrpSpPr>
+            <p:cNvPr id="3" name="Group 2">
+              <a:extLst>
+                <a:ext uri="{FF2B5EF4-FFF2-40B4-BE49-F238E27FC236}">
+                  <a16:creationId xmlns:a16="http://schemas.microsoft.com/office/drawing/2014/main" id="{93737D32-9219-42DF-0DA9-D699E8320F10}"/>
+                </a:ext>
+              </a:extLst>
+            </p:cNvPr>
+            <p:cNvGrpSpPr/>
+            <p:nvPr/>
+          </p:nvGrpSpPr>
+          <p:grpSpPr>
+            <a:xfrm>
+              <a:off x="3939501" y="2222603"/>
+              <a:ext cx="1198180" cy="861848"/>
+              <a:chOff x="7162327" y="515007"/>
+              <a:chExt cx="1198180" cy="861848"/>
+            </a:xfrm>
+          </p:grpSpPr>
+          <p:sp>
+            <p:nvSpPr>
+              <p:cNvPr id="20" name="Rectangle 19">
+                <a:extLst>
+                  <a:ext uri="{FF2B5EF4-FFF2-40B4-BE49-F238E27FC236}">
+                    <a16:creationId xmlns:a16="http://schemas.microsoft.com/office/drawing/2014/main" id="{E3575404-D7BF-7D1C-13B8-7217A213599C}"/>
+                  </a:ext>
+                </a:extLst>
+              </p:cNvPr>
+              <p:cNvSpPr/>
+              <p:nvPr/>
+            </p:nvSpPr>
+            <p:spPr>
+              <a:xfrm>
+                <a:off x="7162327" y="515007"/>
+                <a:ext cx="1198180" cy="861848"/>
+              </a:xfrm>
+              <a:prstGeom prst="rect">
+                <a:avLst/>
+              </a:prstGeom>
+              <a:noFill/>
+            </p:spPr>
+            <p:style>
+              <a:lnRef idx="2">
+                <a:schemeClr val="accent1">
+                  <a:shade val="15000"/>
+                </a:schemeClr>
+              </a:lnRef>
+              <a:fillRef idx="1">
+                <a:schemeClr val="accent1"/>
+              </a:fillRef>
+              <a:effectRef idx="0">
+                <a:schemeClr val="accent1"/>
+              </a:effectRef>
+              <a:fontRef idx="minor">
+                <a:schemeClr val="lt1"/>
+              </a:fontRef>
+            </p:style>
+            <p:txBody>
+              <a:bodyPr rtlCol="0" anchor="ctr"/>
+              <a:lstStyle/>
+              <a:p>
+                <a:pPr algn="ctr"/>
+                <a:endParaRPr lang="en-US"/>
+              </a:p>
+            </p:txBody>
+          </p:sp>
+          <mc:AlternateContent xmlns:mc="http://schemas.openxmlformats.org/markup-compatibility/2006">
+            <mc:Choice xmlns:a14="http://schemas.microsoft.com/office/drawing/2010/main" Requires="a14">
+              <p:sp>
+                <p:nvSpPr>
+                  <p:cNvPr id="21" name="TextBox 20">
+                    <a:extLst>
+                      <a:ext uri="{FF2B5EF4-FFF2-40B4-BE49-F238E27FC236}">
+                        <a16:creationId xmlns:a16="http://schemas.microsoft.com/office/drawing/2014/main" id="{06CC70E3-2D08-51E0-BC69-712D1919E07C}"/>
+                      </a:ext>
+                    </a:extLst>
+                  </p:cNvPr>
+                  <p:cNvSpPr txBox="1"/>
+                  <p:nvPr/>
+                </p:nvSpPr>
+                <p:spPr>
+                  <a:xfrm>
+                    <a:off x="7363167" y="730524"/>
+                    <a:ext cx="796500" cy="646331"/>
+                  </a:xfrm>
+                  <a:prstGeom prst="rect">
+                    <a:avLst/>
+                  </a:prstGeom>
+                  <a:noFill/>
+                </p:spPr>
+                <p:txBody>
+                  <a:bodyPr wrap="none" rtlCol="0">
+                    <a:spAutoFit/>
+                  </a:bodyPr>
+                  <a:lstStyle/>
+                  <a:p>
+                    <a:pPr/>
+                    <a14:m>
+                      <m:oMathPara xmlns:m="http://schemas.openxmlformats.org/officeDocument/2006/math">
+                        <m:oMathParaPr>
+                          <m:jc m:val="centerGroup"/>
+                        </m:oMathParaPr>
+                        <m:oMath xmlns:m="http://schemas.openxmlformats.org/officeDocument/2006/math">
+                          <m:sSub>
+                            <m:sSubPr>
+                              <m:ctrlPr>
+                                <a:rPr lang="en-GB" b="0" i="1" smtClean="0">
+                                  <a:latin typeface="Cambria Math" panose="02040503050406030204" pitchFamily="18" charset="0"/>
+                                </a:rPr>
+                              </m:ctrlPr>
+                            </m:sSubPr>
+                            <m:e>
+                              <m:r>
+                                <a:rPr lang="en-GB" b="0" i="1" smtClean="0">
+                                  <a:latin typeface="Cambria Math" panose="02040503050406030204" pitchFamily="18" charset="0"/>
+                                </a:rPr>
+                                <m:t>𝐻</m:t>
+                              </m:r>
+                            </m:e>
+                            <m:sub>
+                              <m:r>
+                                <a:rPr lang="en-GB" b="0" i="1" smtClean="0">
+                                  <a:latin typeface="Cambria Math" panose="02040503050406030204" pitchFamily="18" charset="0"/>
+                                </a:rPr>
+                                <m:t>1</m:t>
+                              </m:r>
+                            </m:sub>
+                          </m:sSub>
+                          <m:r>
+                            <a:rPr lang="en-GB" b="0" i="1" smtClean="0">
+                              <a:latin typeface="Cambria Math" panose="02040503050406030204" pitchFamily="18" charset="0"/>
+                            </a:rPr>
+                            <m:t>(</m:t>
+                          </m:r>
+                          <m:r>
+                            <a:rPr lang="en-GB" b="0" i="1" smtClean="0">
+                              <a:latin typeface="Cambria Math" panose="02040503050406030204" pitchFamily="18" charset="0"/>
+                            </a:rPr>
+                            <m:t>𝑧</m:t>
+                          </m:r>
+                          <m:r>
+                            <a:rPr lang="en-GB" b="0" i="1" smtClean="0">
+                              <a:latin typeface="Cambria Math" panose="02040503050406030204" pitchFamily="18" charset="0"/>
+                            </a:rPr>
+                            <m:t>)</m:t>
+                          </m:r>
+                        </m:oMath>
+                      </m:oMathPara>
+                    </a14:m>
+                    <a:endParaRPr lang="en-GB" b="0" dirty="0"/>
+                  </a:p>
+                  <a:p>
+                    <a:endParaRPr lang="en-US" dirty="0"/>
+                  </a:p>
+                </p:txBody>
+              </p:sp>
+            </mc:Choice>
+            <mc:Fallback>
+              <p:sp>
+                <p:nvSpPr>
+                  <p:cNvPr id="21" name="TextBox 20">
+                    <a:extLst>
+                      <a:ext uri="{FF2B5EF4-FFF2-40B4-BE49-F238E27FC236}">
+                        <a16:creationId xmlns:a16="http://schemas.microsoft.com/office/drawing/2014/main" id="{06CC70E3-2D08-51E0-BC69-712D1919E07C}"/>
+                      </a:ext>
+                    </a:extLst>
+                  </p:cNvPr>
+                  <p:cNvSpPr txBox="1">
+                    <a:spLocks noRot="1" noChangeAspect="1" noMove="1" noResize="1" noEditPoints="1" noAdjustHandles="1" noChangeArrowheads="1" noChangeShapeType="1" noTextEdit="1"/>
+                  </p:cNvSpPr>
+                  <p:nvPr/>
+                </p:nvSpPr>
+                <p:spPr>
+                  <a:xfrm>
+                    <a:off x="7363167" y="730524"/>
+                    <a:ext cx="796500" cy="646331"/>
+                  </a:xfrm>
+                  <a:prstGeom prst="rect">
+                    <a:avLst/>
+                  </a:prstGeom>
+                  <a:blipFill>
+                    <a:blip r:embed="rId11"/>
+                    <a:stretch>
+                      <a:fillRect/>
+                    </a:stretch>
+                  </a:blipFill>
+                </p:spPr>
+                <p:txBody>
+                  <a:bodyPr/>
+                  <a:lstStyle/>
+                  <a:p>
+                    <a:r>
+                      <a:rPr lang="en-US">
+                        <a:noFill/>
+                      </a:rPr>
+                      <a:t> </a:t>
+                    </a:r>
+                  </a:p>
+                </p:txBody>
+              </p:sp>
+            </mc:Fallback>
+          </mc:AlternateContent>
+        </p:grpSp>
+        <p:cxnSp>
+          <p:nvCxnSpPr>
+            <p:cNvPr id="6" name="Straight Arrow Connector 5">
+              <a:extLst>
+                <a:ext uri="{FF2B5EF4-FFF2-40B4-BE49-F238E27FC236}">
+                  <a16:creationId xmlns:a16="http://schemas.microsoft.com/office/drawing/2014/main" id="{F4E6C9CC-C8F3-2A8D-5528-874598547A3F}"/>
+                </a:ext>
+              </a:extLst>
+            </p:cNvPr>
+            <p:cNvCxnSpPr>
+              <a:cxnSpLocks/>
+            </p:cNvCxnSpPr>
+            <p:nvPr/>
+          </p:nvCxnSpPr>
+          <p:spPr>
+            <a:xfrm>
+              <a:off x="5137681" y="2673878"/>
+              <a:ext cx="359743" cy="0"/>
+            </a:xfrm>
+            <a:prstGeom prst="straightConnector1">
+              <a:avLst/>
+            </a:prstGeom>
+            <a:ln>
+              <a:prstDash val="solid"/>
+              <a:headEnd type="none" w="med" len="med"/>
+              <a:tailEnd type="none" w="med" len="med"/>
+            </a:ln>
+          </p:spPr>
+          <p:style>
+            <a:lnRef idx="2">
+              <a:schemeClr val="accent1"/>
+            </a:lnRef>
+            <a:fillRef idx="0">
+              <a:schemeClr val="accent1"/>
+            </a:fillRef>
+            <a:effectRef idx="1">
+              <a:schemeClr val="accent1"/>
+            </a:effectRef>
+            <a:fontRef idx="minor">
+              <a:schemeClr val="tx1"/>
+            </a:fontRef>
+          </p:style>
+        </p:cxnSp>
+        <p:cxnSp>
+          <p:nvCxnSpPr>
+            <p:cNvPr id="10" name="Straight Arrow Connector 9">
+              <a:extLst>
+                <a:ext uri="{FF2B5EF4-FFF2-40B4-BE49-F238E27FC236}">
+                  <a16:creationId xmlns:a16="http://schemas.microsoft.com/office/drawing/2014/main" id="{DFD6C8C0-E9DF-9BED-F1E7-8FD7EEBEAB78}"/>
+                </a:ext>
+              </a:extLst>
+            </p:cNvPr>
+            <p:cNvCxnSpPr>
+              <a:cxnSpLocks/>
+            </p:cNvCxnSpPr>
+            <p:nvPr/>
+          </p:nvCxnSpPr>
+          <p:spPr>
+            <a:xfrm>
+              <a:off x="3220015" y="2647937"/>
+              <a:ext cx="719486" cy="0"/>
+            </a:xfrm>
+            <a:prstGeom prst="straightConnector1">
+              <a:avLst/>
+            </a:prstGeom>
+            <a:ln>
+              <a:tailEnd type="triangle"/>
+            </a:ln>
+          </p:spPr>
+          <p:style>
+            <a:lnRef idx="2">
+              <a:schemeClr val="accent1"/>
+            </a:lnRef>
+            <a:fillRef idx="0">
+              <a:schemeClr val="accent1"/>
+            </a:fillRef>
+            <a:effectRef idx="1">
+              <a:schemeClr val="accent1"/>
+            </a:effectRef>
+            <a:fontRef idx="minor">
+              <a:schemeClr val="tx1"/>
+            </a:fontRef>
+          </p:style>
+        </p:cxnSp>
+        <p:sp>
+          <p:nvSpPr>
+            <p:cNvPr id="11" name="Oval 10">
+              <a:extLst>
+                <a:ext uri="{FF2B5EF4-FFF2-40B4-BE49-F238E27FC236}">
+                  <a16:creationId xmlns:a16="http://schemas.microsoft.com/office/drawing/2014/main" id="{996043A3-DB22-2E9E-6F4C-2BF1AA14AB27}"/>
+                </a:ext>
+              </a:extLst>
+            </p:cNvPr>
+            <p:cNvSpPr/>
+            <p:nvPr/>
+          </p:nvSpPr>
+          <p:spPr>
+            <a:xfrm>
+              <a:off x="2314372" y="3893658"/>
+              <a:ext cx="184666" cy="184666"/>
+            </a:xfrm>
+            <a:prstGeom prst="ellipse">
+              <a:avLst/>
+            </a:prstGeom>
+            <a:noFill/>
+          </p:spPr>
+          <p:style>
+            <a:lnRef idx="2">
+              <a:schemeClr val="accent1">
+                <a:shade val="15000"/>
+              </a:schemeClr>
+            </a:lnRef>
+            <a:fillRef idx="1">
+              <a:schemeClr val="accent1"/>
+            </a:fillRef>
+            <a:effectRef idx="0">
+              <a:schemeClr val="accent1"/>
+            </a:effectRef>
+            <a:fontRef idx="minor">
+              <a:schemeClr val="lt1"/>
+            </a:fontRef>
+          </p:style>
+          <p:txBody>
+            <a:bodyPr rtlCol="0" anchor="ctr"/>
+            <a:lstStyle/>
+            <a:p>
+              <a:pPr algn="ctr"/>
+              <a:endParaRPr lang="en-US"/>
+            </a:p>
+          </p:txBody>
+        </p:sp>
+        <p:sp>
+          <p:nvSpPr>
+            <p:cNvPr id="12" name="Oval 11">
+              <a:extLst>
+                <a:ext uri="{FF2B5EF4-FFF2-40B4-BE49-F238E27FC236}">
+                  <a16:creationId xmlns:a16="http://schemas.microsoft.com/office/drawing/2014/main" id="{83122FA8-703A-EA9D-447F-7594C23FCE4F}"/>
+                </a:ext>
+              </a:extLst>
+            </p:cNvPr>
+            <p:cNvSpPr/>
+            <p:nvPr/>
+          </p:nvSpPr>
+          <p:spPr>
+            <a:xfrm>
+              <a:off x="7041919" y="3893658"/>
+              <a:ext cx="184666" cy="184666"/>
+            </a:xfrm>
+            <a:prstGeom prst="ellipse">
+              <a:avLst/>
+            </a:prstGeom>
+            <a:noFill/>
+          </p:spPr>
+          <p:style>
+            <a:lnRef idx="2">
+              <a:schemeClr val="accent1">
+                <a:shade val="15000"/>
+              </a:schemeClr>
+            </a:lnRef>
+            <a:fillRef idx="1">
+              <a:schemeClr val="accent1"/>
+            </a:fillRef>
+            <a:effectRef idx="0">
+              <a:schemeClr val="accent1"/>
+            </a:effectRef>
+            <a:fontRef idx="minor">
+              <a:schemeClr val="lt1"/>
+            </a:fontRef>
+          </p:style>
+          <p:txBody>
+            <a:bodyPr rtlCol="0" anchor="ctr"/>
+            <a:lstStyle/>
+            <a:p>
+              <a:pPr algn="ctr"/>
+              <a:endParaRPr lang="en-US"/>
+            </a:p>
+          </p:txBody>
+        </p:sp>
+        <mc:AlternateContent xmlns:mc="http://schemas.openxmlformats.org/markup-compatibility/2006">
+          <mc:Choice xmlns:a14="http://schemas.microsoft.com/office/drawing/2010/main" Requires="a14">
+            <p:sp>
+              <p:nvSpPr>
+                <p:cNvPr id="13" name="TextBox 12">
+                  <a:extLst>
+                    <a:ext uri="{FF2B5EF4-FFF2-40B4-BE49-F238E27FC236}">
+                      <a16:creationId xmlns:a16="http://schemas.microsoft.com/office/drawing/2014/main" id="{2838B1C3-CD25-A8F7-2386-0C09CB1C1399}"/>
+                    </a:ext>
+                  </a:extLst>
+                </p:cNvPr>
+                <p:cNvSpPr txBox="1"/>
+                <p:nvPr/>
+              </p:nvSpPr>
+              <p:spPr>
+                <a:xfrm>
+                  <a:off x="1642412" y="3801325"/>
+                  <a:ext cx="694421" cy="369332"/>
+                </a:xfrm>
+                <a:prstGeom prst="rect">
+                  <a:avLst/>
+                </a:prstGeom>
+                <a:noFill/>
+              </p:spPr>
+              <p:txBody>
+                <a:bodyPr wrap="none" rtlCol="0">
+                  <a:spAutoFit/>
+                </a:bodyPr>
+                <a:lstStyle/>
+                <a:p>
+                  <a:pPr/>
+                  <a14:m>
+                    <m:oMathPara xmlns:m="http://schemas.openxmlformats.org/officeDocument/2006/math">
+                      <m:oMathParaPr>
+                        <m:jc m:val="centerGroup"/>
+                      </m:oMathParaPr>
+                      <m:oMath xmlns:m="http://schemas.openxmlformats.org/officeDocument/2006/math">
+                        <m:r>
+                          <a:rPr lang="en-GB" b="0" i="1" smtClean="0">
+                            <a:latin typeface="Cambria Math" panose="02040503050406030204" pitchFamily="18" charset="0"/>
+                          </a:rPr>
+                          <m:t>𝑋</m:t>
+                        </m:r>
+                        <m:r>
+                          <a:rPr lang="en-GB" b="0" i="1" smtClean="0">
+                            <a:latin typeface="Cambria Math" panose="02040503050406030204" pitchFamily="18" charset="0"/>
+                          </a:rPr>
+                          <m:t>(</m:t>
+                        </m:r>
+                        <m:r>
+                          <a:rPr lang="en-GB" b="0" i="1" smtClean="0">
+                            <a:latin typeface="Cambria Math" panose="02040503050406030204" pitchFamily="18" charset="0"/>
+                          </a:rPr>
+                          <m:t>𝑧</m:t>
+                        </m:r>
+                        <m:r>
+                          <a:rPr lang="en-GB" b="0" i="1" smtClean="0">
+                            <a:latin typeface="Cambria Math" panose="02040503050406030204" pitchFamily="18" charset="0"/>
+                          </a:rPr>
+                          <m:t>)</m:t>
+                        </m:r>
+                      </m:oMath>
+                    </m:oMathPara>
+                  </a14:m>
+                  <a:endParaRPr lang="en-US" dirty="0"/>
+                </a:p>
+              </p:txBody>
+            </p:sp>
+          </mc:Choice>
+          <mc:Fallback>
+            <p:sp>
+              <p:nvSpPr>
+                <p:cNvPr id="13" name="TextBox 12">
+                  <a:extLst>
+                    <a:ext uri="{FF2B5EF4-FFF2-40B4-BE49-F238E27FC236}">
+                      <a16:creationId xmlns:a16="http://schemas.microsoft.com/office/drawing/2014/main" id="{2838B1C3-CD25-A8F7-2386-0C09CB1C1399}"/>
+                    </a:ext>
+                  </a:extLst>
+                </p:cNvPr>
+                <p:cNvSpPr txBox="1">
+                  <a:spLocks noRot="1" noChangeAspect="1" noMove="1" noResize="1" noEditPoints="1" noAdjustHandles="1" noChangeArrowheads="1" noChangeShapeType="1" noTextEdit="1"/>
+                </p:cNvSpPr>
+                <p:nvPr/>
+              </p:nvSpPr>
+              <p:spPr>
+                <a:xfrm>
+                  <a:off x="1642412" y="3801325"/>
+                  <a:ext cx="694421" cy="369332"/>
+                </a:xfrm>
+                <a:prstGeom prst="rect">
+                  <a:avLst/>
+                </a:prstGeom>
+                <a:blipFill>
+                  <a:blip r:embed="rId12"/>
+                  <a:stretch>
+                    <a:fillRect b="-16667"/>
+                  </a:stretch>
+                </a:blipFill>
+              </p:spPr>
+              <p:txBody>
+                <a:bodyPr/>
+                <a:lstStyle/>
+                <a:p>
+                  <a:r>
+                    <a:rPr lang="en-US">
+                      <a:noFill/>
+                    </a:rPr>
+                    <a:t> </a:t>
+                  </a:r>
+                </a:p>
+              </p:txBody>
+            </p:sp>
+          </mc:Fallback>
+        </mc:AlternateContent>
+        <mc:AlternateContent xmlns:mc="http://schemas.openxmlformats.org/markup-compatibility/2006">
+          <mc:Choice xmlns:a14="http://schemas.microsoft.com/office/drawing/2010/main" Requires="a14">
+            <p:sp>
+              <p:nvSpPr>
+                <p:cNvPr id="14" name="TextBox 13">
+                  <a:extLst>
+                    <a:ext uri="{FF2B5EF4-FFF2-40B4-BE49-F238E27FC236}">
+                      <a16:creationId xmlns:a16="http://schemas.microsoft.com/office/drawing/2014/main" id="{2EE37CA1-072E-53A6-2E53-38B2B2DDEA9B}"/>
+                    </a:ext>
+                  </a:extLst>
+                </p:cNvPr>
+                <p:cNvSpPr txBox="1"/>
+                <p:nvPr/>
+              </p:nvSpPr>
+              <p:spPr>
+                <a:xfrm>
+                  <a:off x="7243952" y="3794618"/>
+                  <a:ext cx="694421" cy="369332"/>
+                </a:xfrm>
+                <a:prstGeom prst="rect">
+                  <a:avLst/>
+                </a:prstGeom>
+                <a:noFill/>
+              </p:spPr>
+              <p:txBody>
+                <a:bodyPr wrap="square" rtlCol="0">
+                  <a:spAutoFit/>
+                </a:bodyPr>
+                <a:lstStyle/>
+                <a:p>
+                  <a:pPr/>
+                  <a14:m>
+                    <m:oMathPara xmlns:m="http://schemas.openxmlformats.org/officeDocument/2006/math">
+                      <m:oMathParaPr>
+                        <m:jc m:val="centerGroup"/>
+                      </m:oMathParaPr>
+                      <m:oMath xmlns:m="http://schemas.openxmlformats.org/officeDocument/2006/math">
+                        <m:r>
+                          <a:rPr lang="en-GB" b="0" i="1" smtClean="0">
+                            <a:latin typeface="Cambria Math" panose="02040503050406030204" pitchFamily="18" charset="0"/>
+                          </a:rPr>
+                          <m:t>𝑌</m:t>
+                        </m:r>
+                        <m:r>
+                          <a:rPr lang="en-GB" b="0" i="1" smtClean="0">
+                            <a:latin typeface="Cambria Math" panose="02040503050406030204" pitchFamily="18" charset="0"/>
+                          </a:rPr>
+                          <m:t>(</m:t>
+                        </m:r>
+                        <m:r>
+                          <a:rPr lang="en-GB" b="0" i="1" smtClean="0">
+                            <a:latin typeface="Cambria Math" panose="02040503050406030204" pitchFamily="18" charset="0"/>
+                          </a:rPr>
+                          <m:t>𝑧</m:t>
+                        </m:r>
+                        <m:r>
+                          <a:rPr lang="en-GB" b="0" i="1" smtClean="0">
+                            <a:latin typeface="Cambria Math" panose="02040503050406030204" pitchFamily="18" charset="0"/>
+                          </a:rPr>
+                          <m:t>)</m:t>
+                        </m:r>
+                      </m:oMath>
+                    </m:oMathPara>
+                  </a14:m>
+                  <a:endParaRPr lang="en-US" dirty="0"/>
+                </a:p>
+              </p:txBody>
+            </p:sp>
+          </mc:Choice>
+          <mc:Fallback>
+            <p:sp>
+              <p:nvSpPr>
+                <p:cNvPr id="14" name="TextBox 13">
+                  <a:extLst>
+                    <a:ext uri="{FF2B5EF4-FFF2-40B4-BE49-F238E27FC236}">
+                      <a16:creationId xmlns:a16="http://schemas.microsoft.com/office/drawing/2014/main" id="{2EE37CA1-072E-53A6-2E53-38B2B2DDEA9B}"/>
+                    </a:ext>
+                  </a:extLst>
+                </p:cNvPr>
+                <p:cNvSpPr txBox="1">
+                  <a:spLocks noRot="1" noChangeAspect="1" noMove="1" noResize="1" noEditPoints="1" noAdjustHandles="1" noChangeArrowheads="1" noChangeShapeType="1" noTextEdit="1"/>
+                </p:cNvSpPr>
+                <p:nvPr/>
+              </p:nvSpPr>
+              <p:spPr>
+                <a:xfrm>
+                  <a:off x="7243952" y="3794618"/>
+                  <a:ext cx="694421" cy="369332"/>
+                </a:xfrm>
+                <a:prstGeom prst="rect">
+                  <a:avLst/>
+                </a:prstGeom>
+                <a:blipFill>
+                  <a:blip r:embed="rId13"/>
+                  <a:stretch>
+                    <a:fillRect b="-13333"/>
+                  </a:stretch>
+                </a:blipFill>
+              </p:spPr>
+              <p:txBody>
+                <a:bodyPr/>
+                <a:lstStyle/>
+                <a:p>
+                  <a:r>
+                    <a:rPr lang="en-US">
+                      <a:noFill/>
+                    </a:rPr>
+                    <a:t> </a:t>
+                  </a:r>
+                </a:p>
+              </p:txBody>
+            </p:sp>
+          </mc:Fallback>
+        </mc:AlternateContent>
+        <p:cxnSp>
+          <p:nvCxnSpPr>
+            <p:cNvPr id="15" name="Straight Connector 14">
+              <a:extLst>
+                <a:ext uri="{FF2B5EF4-FFF2-40B4-BE49-F238E27FC236}">
+                  <a16:creationId xmlns:a16="http://schemas.microsoft.com/office/drawing/2014/main" id="{A3B16FB4-ABA3-AD31-ED61-04223D211FCA}"/>
+                </a:ext>
+              </a:extLst>
+            </p:cNvPr>
+            <p:cNvCxnSpPr>
+              <a:cxnSpLocks/>
+            </p:cNvCxnSpPr>
+            <p:nvPr/>
+          </p:nvCxnSpPr>
+          <p:spPr>
+            <a:xfrm>
+              <a:off x="4538590" y="4487717"/>
+              <a:ext cx="0" cy="1154278"/>
+            </a:xfrm>
+            <a:prstGeom prst="line">
+              <a:avLst/>
+            </a:prstGeom>
+            <a:ln>
+              <a:prstDash val="sysDash"/>
+            </a:ln>
+          </p:spPr>
+          <p:style>
+            <a:lnRef idx="2">
+              <a:schemeClr val="accent1"/>
+            </a:lnRef>
+            <a:fillRef idx="0">
+              <a:schemeClr val="accent1"/>
+            </a:fillRef>
+            <a:effectRef idx="1">
+              <a:schemeClr val="accent1"/>
+            </a:effectRef>
+            <a:fontRef idx="minor">
+              <a:schemeClr val="tx1"/>
+            </a:fontRef>
+          </p:style>
+        </p:cxnSp>
+        <p:cxnSp>
+          <p:nvCxnSpPr>
+            <p:cNvPr id="23" name="Straight Arrow Connector 22">
+              <a:extLst>
+                <a:ext uri="{FF2B5EF4-FFF2-40B4-BE49-F238E27FC236}">
+                  <a16:creationId xmlns:a16="http://schemas.microsoft.com/office/drawing/2014/main" id="{7A32EF34-760D-C728-90A9-6FA1672C69F9}"/>
+                </a:ext>
+              </a:extLst>
+            </p:cNvPr>
+            <p:cNvCxnSpPr>
+              <a:cxnSpLocks/>
+            </p:cNvCxnSpPr>
+            <p:nvPr/>
+          </p:nvCxnSpPr>
+          <p:spPr>
+            <a:xfrm>
+              <a:off x="5137681" y="3985211"/>
+              <a:ext cx="719486" cy="0"/>
+            </a:xfrm>
+            <a:prstGeom prst="straightConnector1">
+              <a:avLst/>
+            </a:prstGeom>
+            <a:ln>
+              <a:tailEnd type="triangle"/>
+            </a:ln>
+          </p:spPr>
+          <p:style>
+            <a:lnRef idx="2">
+              <a:schemeClr val="accent1"/>
+            </a:lnRef>
+            <a:fillRef idx="0">
+              <a:schemeClr val="accent1"/>
+            </a:fillRef>
+            <a:effectRef idx="1">
+              <a:schemeClr val="accent1"/>
+            </a:effectRef>
+            <a:fontRef idx="minor">
+              <a:schemeClr val="tx1"/>
+            </a:fontRef>
+          </p:style>
+        </p:cxnSp>
+        <p:cxnSp>
+          <p:nvCxnSpPr>
+            <p:cNvPr id="24" name="Straight Arrow Connector 23">
+              <a:extLst>
+                <a:ext uri="{FF2B5EF4-FFF2-40B4-BE49-F238E27FC236}">
+                  <a16:creationId xmlns:a16="http://schemas.microsoft.com/office/drawing/2014/main" id="{E21DC6B0-F217-3067-4840-2204B5BADA8F}"/>
+                </a:ext>
+              </a:extLst>
+            </p:cNvPr>
+            <p:cNvCxnSpPr>
+              <a:cxnSpLocks/>
+              <a:stCxn id="11" idx="6"/>
+            </p:cNvCxnSpPr>
+            <p:nvPr/>
+          </p:nvCxnSpPr>
+          <p:spPr>
+            <a:xfrm flipV="1">
+              <a:off x="2499038" y="3979286"/>
+              <a:ext cx="1440463" cy="6705"/>
+            </a:xfrm>
+            <a:prstGeom prst="straightConnector1">
+              <a:avLst/>
+            </a:prstGeom>
+            <a:ln>
+              <a:tailEnd type="triangle"/>
+            </a:ln>
+          </p:spPr>
+          <p:style>
+            <a:lnRef idx="2">
+              <a:schemeClr val="accent1"/>
+            </a:lnRef>
+            <a:fillRef idx="0">
+              <a:schemeClr val="accent1"/>
+            </a:fillRef>
+            <a:effectRef idx="1">
+              <a:schemeClr val="accent1"/>
+            </a:effectRef>
+            <a:fontRef idx="minor">
+              <a:schemeClr val="tx1"/>
+            </a:fontRef>
+          </p:style>
+        </p:cxnSp>
+        <p:sp>
+          <p:nvSpPr>
+            <p:cNvPr id="26" name="Rectangle 25">
+              <a:extLst>
+                <a:ext uri="{FF2B5EF4-FFF2-40B4-BE49-F238E27FC236}">
+                  <a16:creationId xmlns:a16="http://schemas.microsoft.com/office/drawing/2014/main" id="{F1479AFF-C8DC-42A2-F64B-005749238FDC}"/>
+                </a:ext>
+              </a:extLst>
+            </p:cNvPr>
+            <p:cNvSpPr/>
+            <p:nvPr/>
+          </p:nvSpPr>
+          <p:spPr>
+            <a:xfrm>
+              <a:off x="3939501" y="950183"/>
+              <a:ext cx="1198180" cy="861848"/>
+            </a:xfrm>
+            <a:prstGeom prst="rect">
+              <a:avLst/>
+            </a:prstGeom>
+            <a:noFill/>
+          </p:spPr>
+          <p:style>
+            <a:lnRef idx="2">
+              <a:schemeClr val="accent1">
+                <a:shade val="15000"/>
+              </a:schemeClr>
+            </a:lnRef>
+            <a:fillRef idx="1">
+              <a:schemeClr val="accent1"/>
+            </a:fillRef>
+            <a:effectRef idx="0">
+              <a:schemeClr val="accent1"/>
+            </a:effectRef>
+            <a:fontRef idx="minor">
+              <a:schemeClr val="lt1"/>
+            </a:fontRef>
+          </p:style>
+          <p:txBody>
+            <a:bodyPr rtlCol="0" anchor="ctr"/>
+            <a:lstStyle/>
+            <a:p>
+              <a:pPr algn="ctr"/>
+              <a:endParaRPr lang="en-US"/>
+            </a:p>
+          </p:txBody>
+        </p:sp>
+        <mc:AlternateContent xmlns:mc="http://schemas.openxmlformats.org/markup-compatibility/2006">
+          <mc:Choice xmlns:a14="http://schemas.microsoft.com/office/drawing/2010/main" Requires="a14">
+            <p:sp>
+              <p:nvSpPr>
+                <p:cNvPr id="27" name="TextBox 26">
+                  <a:extLst>
+                    <a:ext uri="{FF2B5EF4-FFF2-40B4-BE49-F238E27FC236}">
+                      <a16:creationId xmlns:a16="http://schemas.microsoft.com/office/drawing/2014/main" id="{7F2594CA-37F1-780C-F5CA-D1F71CFBDDC6}"/>
+                    </a:ext>
+                  </a:extLst>
+                </p:cNvPr>
+                <p:cNvSpPr txBox="1"/>
+                <p:nvPr/>
+              </p:nvSpPr>
+              <p:spPr>
+                <a:xfrm>
+                  <a:off x="4338568" y="1165700"/>
+                  <a:ext cx="400046" cy="369332"/>
+                </a:xfrm>
+                <a:prstGeom prst="rect">
+                  <a:avLst/>
+                </a:prstGeom>
+                <a:noFill/>
+              </p:spPr>
+              <p:txBody>
+                <a:bodyPr wrap="none" rtlCol="0">
+                  <a:spAutoFit/>
+                </a:bodyPr>
+                <a:lstStyle/>
+                <a:p>
+                  <a:pPr/>
+                  <a14:m>
+                    <m:oMathPara xmlns:m="http://schemas.openxmlformats.org/officeDocument/2006/math">
+                      <m:oMathParaPr>
+                        <m:jc m:val="centerGroup"/>
+                      </m:oMathParaPr>
+                      <m:oMath xmlns:m="http://schemas.openxmlformats.org/officeDocument/2006/math">
+                        <m:r>
+                          <a:rPr lang="en-GB" b="0" i="1" smtClean="0">
+                            <a:latin typeface="Cambria Math" panose="02040503050406030204" pitchFamily="18" charset="0"/>
+                          </a:rPr>
+                          <m:t>𝐾</m:t>
+                        </m:r>
+                      </m:oMath>
+                    </m:oMathPara>
+                  </a14:m>
+                  <a:endParaRPr lang="en-US" dirty="0"/>
+                </a:p>
+              </p:txBody>
+            </p:sp>
+          </mc:Choice>
+          <mc:Fallback>
+            <p:sp>
+              <p:nvSpPr>
+                <p:cNvPr id="27" name="TextBox 26">
+                  <a:extLst>
+                    <a:ext uri="{FF2B5EF4-FFF2-40B4-BE49-F238E27FC236}">
+                      <a16:creationId xmlns:a16="http://schemas.microsoft.com/office/drawing/2014/main" id="{7F2594CA-37F1-780C-F5CA-D1F71CFBDDC6}"/>
+                    </a:ext>
+                  </a:extLst>
+                </p:cNvPr>
+                <p:cNvSpPr txBox="1">
+                  <a:spLocks noRot="1" noChangeAspect="1" noMove="1" noResize="1" noEditPoints="1" noAdjustHandles="1" noChangeArrowheads="1" noChangeShapeType="1" noTextEdit="1"/>
+                </p:cNvSpPr>
+                <p:nvPr/>
+              </p:nvSpPr>
+              <p:spPr>
+                <a:xfrm>
+                  <a:off x="4338568" y="1165700"/>
+                  <a:ext cx="400046" cy="369332"/>
+                </a:xfrm>
+                <a:prstGeom prst="rect">
+                  <a:avLst/>
+                </a:prstGeom>
+                <a:blipFill>
+                  <a:blip r:embed="rId14"/>
+                  <a:stretch>
+                    <a:fillRect/>
+                  </a:stretch>
+                </a:blipFill>
+              </p:spPr>
+              <p:txBody>
+                <a:bodyPr/>
+                <a:lstStyle/>
+                <a:p>
+                  <a:r>
+                    <a:rPr lang="en-US">
+                      <a:noFill/>
+                    </a:rPr>
+                    <a:t> </a:t>
+                  </a:r>
+                </a:p>
+              </p:txBody>
+            </p:sp>
+          </mc:Fallback>
+        </mc:AlternateContent>
+        <p:cxnSp>
+          <p:nvCxnSpPr>
+            <p:cNvPr id="28" name="Straight Arrow Connector 27">
+              <a:extLst>
+                <a:ext uri="{FF2B5EF4-FFF2-40B4-BE49-F238E27FC236}">
+                  <a16:creationId xmlns:a16="http://schemas.microsoft.com/office/drawing/2014/main" id="{9C8B3682-0DAA-6DFE-768F-17C80110F8C0}"/>
+                </a:ext>
+              </a:extLst>
+            </p:cNvPr>
+            <p:cNvCxnSpPr>
+              <a:cxnSpLocks/>
+            </p:cNvCxnSpPr>
+            <p:nvPr/>
+          </p:nvCxnSpPr>
+          <p:spPr>
+            <a:xfrm>
+              <a:off x="5137681" y="1401458"/>
+              <a:ext cx="955967" cy="0"/>
+            </a:xfrm>
+            <a:prstGeom prst="straightConnector1">
+              <a:avLst/>
+            </a:prstGeom>
+            <a:ln>
+              <a:headEnd type="none" w="med" len="med"/>
+              <a:tailEnd type="none" w="med" len="med"/>
+            </a:ln>
+          </p:spPr>
+          <p:style>
+            <a:lnRef idx="2">
+              <a:schemeClr val="accent1"/>
+            </a:lnRef>
+            <a:fillRef idx="0">
+              <a:schemeClr val="accent1"/>
+            </a:fillRef>
+            <a:effectRef idx="1">
+              <a:schemeClr val="accent1"/>
+            </a:effectRef>
+            <a:fontRef idx="minor">
+              <a:schemeClr val="tx1"/>
+            </a:fontRef>
+          </p:style>
+        </p:cxnSp>
+        <p:cxnSp>
+          <p:nvCxnSpPr>
+            <p:cNvPr id="29" name="Straight Arrow Connector 28">
+              <a:extLst>
+                <a:ext uri="{FF2B5EF4-FFF2-40B4-BE49-F238E27FC236}">
+                  <a16:creationId xmlns:a16="http://schemas.microsoft.com/office/drawing/2014/main" id="{8B98F3F1-1A68-782A-5899-2B62DDC99A5A}"/>
+                </a:ext>
+              </a:extLst>
+            </p:cNvPr>
+            <p:cNvCxnSpPr>
+              <a:cxnSpLocks/>
+            </p:cNvCxnSpPr>
+            <p:nvPr/>
+          </p:nvCxnSpPr>
+          <p:spPr>
+            <a:xfrm>
+              <a:off x="3220015" y="1375517"/>
+              <a:ext cx="719486" cy="0"/>
+            </a:xfrm>
+            <a:prstGeom prst="straightConnector1">
+              <a:avLst/>
+            </a:prstGeom>
+            <a:ln>
+              <a:tailEnd type="triangle"/>
+            </a:ln>
+          </p:spPr>
+          <p:style>
+            <a:lnRef idx="2">
+              <a:schemeClr val="accent1"/>
+            </a:lnRef>
+            <a:fillRef idx="0">
+              <a:schemeClr val="accent1"/>
+            </a:fillRef>
+            <a:effectRef idx="1">
+              <a:schemeClr val="accent1"/>
+            </a:effectRef>
+            <a:fontRef idx="minor">
+              <a:schemeClr val="tx1"/>
+            </a:fontRef>
+          </p:style>
+        </p:cxnSp>
+        <p:cxnSp>
+          <p:nvCxnSpPr>
+            <p:cNvPr id="31" name="Straight Connector 30">
+              <a:extLst>
+                <a:ext uri="{FF2B5EF4-FFF2-40B4-BE49-F238E27FC236}">
+                  <a16:creationId xmlns:a16="http://schemas.microsoft.com/office/drawing/2014/main" id="{FD8995A9-6065-2CA8-3408-C5E83B9BAB7E}"/>
+                </a:ext>
+              </a:extLst>
+            </p:cNvPr>
+            <p:cNvCxnSpPr/>
+            <p:nvPr/>
+          </p:nvCxnSpPr>
+          <p:spPr>
+            <a:xfrm>
+              <a:off x="3220015" y="1375517"/>
+              <a:ext cx="0" cy="4805350"/>
+            </a:xfrm>
+            <a:prstGeom prst="line">
+              <a:avLst/>
+            </a:prstGeom>
+          </p:spPr>
+          <p:style>
+            <a:lnRef idx="2">
+              <a:schemeClr val="accent1"/>
+            </a:lnRef>
+            <a:fillRef idx="0">
+              <a:schemeClr val="accent1"/>
+            </a:fillRef>
+            <a:effectRef idx="1">
+              <a:schemeClr val="accent1"/>
+            </a:effectRef>
+            <a:fontRef idx="minor">
+              <a:schemeClr val="tx1"/>
+            </a:fontRef>
+          </p:style>
+        </p:cxnSp>
+        <p:sp>
+          <p:nvSpPr>
+            <p:cNvPr id="33" name="Oval 32">
+              <a:extLst>
+                <a:ext uri="{FF2B5EF4-FFF2-40B4-BE49-F238E27FC236}">
+                  <a16:creationId xmlns:a16="http://schemas.microsoft.com/office/drawing/2014/main" id="{818F05D1-FCF9-4410-EE91-004E675516B0}"/>
+                </a:ext>
+              </a:extLst>
+            </p:cNvPr>
+            <p:cNvSpPr/>
+            <p:nvPr/>
+          </p:nvSpPr>
+          <p:spPr>
+            <a:xfrm>
+              <a:off x="3168843" y="2608140"/>
+              <a:ext cx="100851" cy="100851"/>
+            </a:xfrm>
+            <a:prstGeom prst="ellipse">
+              <a:avLst/>
+            </a:prstGeom>
+          </p:spPr>
+          <p:style>
+            <a:lnRef idx="2">
+              <a:schemeClr val="accent1">
+                <a:shade val="15000"/>
+              </a:schemeClr>
+            </a:lnRef>
+            <a:fillRef idx="1">
+              <a:schemeClr val="accent1"/>
+            </a:fillRef>
+            <a:effectRef idx="0">
+              <a:schemeClr val="accent1"/>
+            </a:effectRef>
+            <a:fontRef idx="minor">
+              <a:schemeClr val="lt1"/>
+            </a:fontRef>
+          </p:style>
+          <p:txBody>
+            <a:bodyPr rtlCol="0" anchor="ctr"/>
+            <a:lstStyle/>
+            <a:p>
+              <a:pPr algn="ctr"/>
+              <a:endParaRPr lang="en-US"/>
+            </a:p>
+          </p:txBody>
+        </p:sp>
+        <p:sp>
+          <p:nvSpPr>
+            <p:cNvPr id="34" name="Oval 33">
+              <a:extLst>
+                <a:ext uri="{FF2B5EF4-FFF2-40B4-BE49-F238E27FC236}">
+                  <a16:creationId xmlns:a16="http://schemas.microsoft.com/office/drawing/2014/main" id="{6118AD96-8592-BF01-8901-3535ED51B296}"/>
+                </a:ext>
+              </a:extLst>
+            </p:cNvPr>
+            <p:cNvSpPr/>
+            <p:nvPr/>
+          </p:nvSpPr>
+          <p:spPr>
+            <a:xfrm>
+              <a:off x="3166690" y="3928860"/>
+              <a:ext cx="100851" cy="100851"/>
+            </a:xfrm>
+            <a:prstGeom prst="ellipse">
+              <a:avLst/>
+            </a:prstGeom>
+          </p:spPr>
+          <p:style>
+            <a:lnRef idx="2">
+              <a:schemeClr val="accent1">
+                <a:shade val="15000"/>
+              </a:schemeClr>
+            </a:lnRef>
+            <a:fillRef idx="1">
+              <a:schemeClr val="accent1"/>
+            </a:fillRef>
+            <a:effectRef idx="0">
+              <a:schemeClr val="accent1"/>
+            </a:effectRef>
+            <a:fontRef idx="minor">
+              <a:schemeClr val="lt1"/>
+            </a:fontRef>
+          </p:style>
+          <p:txBody>
+            <a:bodyPr rtlCol="0" anchor="ctr"/>
+            <a:lstStyle/>
+            <a:p>
+              <a:pPr algn="ctr"/>
+              <a:endParaRPr lang="en-US"/>
+            </a:p>
+          </p:txBody>
+        </p:sp>
+        <p:sp>
+          <p:nvSpPr>
+            <p:cNvPr id="38" name="Oval 37">
+              <a:extLst>
+                <a:ext uri="{FF2B5EF4-FFF2-40B4-BE49-F238E27FC236}">
+                  <a16:creationId xmlns:a16="http://schemas.microsoft.com/office/drawing/2014/main" id="{CB3E119B-7C8E-DFCB-8D60-4DC8FDC774DE}"/>
+                </a:ext>
+              </a:extLst>
+            </p:cNvPr>
+            <p:cNvSpPr/>
+            <p:nvPr/>
+          </p:nvSpPr>
+          <p:spPr>
+            <a:xfrm>
+              <a:off x="5857166" y="3742802"/>
+              <a:ext cx="472965" cy="472965"/>
+            </a:xfrm>
+            <a:prstGeom prst="ellipse">
+              <a:avLst/>
+            </a:prstGeom>
+            <a:noFill/>
+            <a:ln>
+              <a:solidFill>
+                <a:schemeClr val="tx1"/>
+              </a:solidFill>
+            </a:ln>
+          </p:spPr>
+          <p:style>
+            <a:lnRef idx="2">
+              <a:schemeClr val="accent1">
+                <a:shade val="15000"/>
+              </a:schemeClr>
+            </a:lnRef>
+            <a:fillRef idx="1">
+              <a:schemeClr val="accent1"/>
+            </a:fillRef>
+            <a:effectRef idx="0">
+              <a:schemeClr val="accent1"/>
+            </a:effectRef>
+            <a:fontRef idx="minor">
+              <a:schemeClr val="lt1"/>
+            </a:fontRef>
+          </p:style>
+          <p:txBody>
+            <a:bodyPr rtlCol="0" anchor="ctr"/>
+            <a:lstStyle/>
+            <a:p>
+              <a:pPr algn="ctr"/>
+              <a:endParaRPr lang="en-US"/>
+            </a:p>
+          </p:txBody>
+        </p:sp>
+        <p:cxnSp>
+          <p:nvCxnSpPr>
+            <p:cNvPr id="40" name="Straight Arrow Connector 39">
+              <a:extLst>
+                <a:ext uri="{FF2B5EF4-FFF2-40B4-BE49-F238E27FC236}">
+                  <a16:creationId xmlns:a16="http://schemas.microsoft.com/office/drawing/2014/main" id="{FB40004D-8AA5-243E-D032-FAFAEB5C730F}"/>
+                </a:ext>
+              </a:extLst>
+            </p:cNvPr>
+            <p:cNvCxnSpPr/>
+            <p:nvPr/>
+          </p:nvCxnSpPr>
+          <p:spPr>
+            <a:xfrm>
+              <a:off x="6093648" y="1385747"/>
+              <a:ext cx="0" cy="2367285"/>
+            </a:xfrm>
+            <a:prstGeom prst="straightConnector1">
+              <a:avLst/>
+            </a:prstGeom>
+            <a:ln>
+              <a:tailEnd type="triangle"/>
+            </a:ln>
+          </p:spPr>
+          <p:style>
+            <a:lnRef idx="2">
+              <a:schemeClr val="accent1"/>
+            </a:lnRef>
+            <a:fillRef idx="0">
+              <a:schemeClr val="accent1"/>
+            </a:fillRef>
+            <a:effectRef idx="1">
+              <a:schemeClr val="accent1"/>
+            </a:effectRef>
+            <a:fontRef idx="minor">
+              <a:schemeClr val="tx1"/>
+            </a:fontRef>
+          </p:style>
+        </p:cxnSp>
+        <p:sp>
+          <p:nvSpPr>
+            <p:cNvPr id="42" name="TextBox 41">
+              <a:extLst>
+                <a:ext uri="{FF2B5EF4-FFF2-40B4-BE49-F238E27FC236}">
+                  <a16:creationId xmlns:a16="http://schemas.microsoft.com/office/drawing/2014/main" id="{94E04FED-7BB2-1275-A8AB-569F296AA0D2}"/>
+                </a:ext>
+              </a:extLst>
+            </p:cNvPr>
+            <p:cNvSpPr txBox="1"/>
+            <p:nvPr/>
+          </p:nvSpPr>
+          <p:spPr>
+            <a:xfrm>
+              <a:off x="5891509" y="3696264"/>
+              <a:ext cx="404278" cy="584775"/>
+            </a:xfrm>
+            <a:prstGeom prst="rect">
+              <a:avLst/>
+            </a:prstGeom>
+            <a:noFill/>
+          </p:spPr>
+          <p:txBody>
+            <a:bodyPr wrap="none" rtlCol="0">
+              <a:spAutoFit/>
+            </a:bodyPr>
+            <a:lstStyle/>
+            <a:p>
+              <a:r>
+                <a:rPr lang="en-US" sz="3200" dirty="0"/>
+                <a:t>+</a:t>
+              </a:r>
+            </a:p>
+          </p:txBody>
+        </p:sp>
+        <p:cxnSp>
+          <p:nvCxnSpPr>
+            <p:cNvPr id="44" name="Straight Arrow Connector 43">
+              <a:extLst>
+                <a:ext uri="{FF2B5EF4-FFF2-40B4-BE49-F238E27FC236}">
+                  <a16:creationId xmlns:a16="http://schemas.microsoft.com/office/drawing/2014/main" id="{4387AEF6-721B-AC36-B0D6-B60FFDB700C0}"/>
+                </a:ext>
+              </a:extLst>
+            </p:cNvPr>
+            <p:cNvCxnSpPr>
+              <a:cxnSpLocks/>
+            </p:cNvCxnSpPr>
+            <p:nvPr/>
+          </p:nvCxnSpPr>
+          <p:spPr>
+            <a:xfrm>
+              <a:off x="5497424" y="2658565"/>
+              <a:ext cx="394085" cy="1119627"/>
+            </a:xfrm>
+            <a:prstGeom prst="straightConnector1">
+              <a:avLst/>
+            </a:prstGeom>
+            <a:ln>
+              <a:tailEnd type="triangle"/>
+            </a:ln>
+          </p:spPr>
+          <p:style>
+            <a:lnRef idx="2">
+              <a:schemeClr val="accent1"/>
+            </a:lnRef>
+            <a:fillRef idx="0">
+              <a:schemeClr val="accent1"/>
+            </a:fillRef>
+            <a:effectRef idx="1">
+              <a:schemeClr val="accent1"/>
+            </a:effectRef>
+            <a:fontRef idx="minor">
+              <a:schemeClr val="tx1"/>
+            </a:fontRef>
+          </p:style>
+        </p:cxnSp>
+        <p:cxnSp>
+          <p:nvCxnSpPr>
+            <p:cNvPr id="47" name="Straight Arrow Connector 46">
+              <a:extLst>
+                <a:ext uri="{FF2B5EF4-FFF2-40B4-BE49-F238E27FC236}">
+                  <a16:creationId xmlns:a16="http://schemas.microsoft.com/office/drawing/2014/main" id="{8577A962-6DC0-7433-3E5C-A20D83FB39CE}"/>
+                </a:ext>
+              </a:extLst>
+            </p:cNvPr>
+            <p:cNvCxnSpPr>
+              <a:cxnSpLocks/>
+            </p:cNvCxnSpPr>
+            <p:nvPr/>
+          </p:nvCxnSpPr>
+          <p:spPr>
+            <a:xfrm flipV="1">
+              <a:off x="6093648" y="4215767"/>
+              <a:ext cx="0" cy="1965100"/>
+            </a:xfrm>
+            <a:prstGeom prst="straightConnector1">
+              <a:avLst/>
+            </a:prstGeom>
+            <a:ln>
+              <a:tailEnd type="triangle"/>
+            </a:ln>
+          </p:spPr>
+          <p:style>
+            <a:lnRef idx="2">
+              <a:schemeClr val="accent1"/>
+            </a:lnRef>
+            <a:fillRef idx="0">
+              <a:schemeClr val="accent1"/>
+            </a:fillRef>
+            <a:effectRef idx="1">
+              <a:schemeClr val="accent1"/>
+            </a:effectRef>
+            <a:fontRef idx="minor">
+              <a:schemeClr val="tx1"/>
+            </a:fontRef>
+          </p:style>
+        </p:cxnSp>
+        <p:cxnSp>
+          <p:nvCxnSpPr>
+            <p:cNvPr id="51" name="Straight Arrow Connector 50">
+              <a:extLst>
+                <a:ext uri="{FF2B5EF4-FFF2-40B4-BE49-F238E27FC236}">
+                  <a16:creationId xmlns:a16="http://schemas.microsoft.com/office/drawing/2014/main" id="{F7AA5846-F443-75D8-EF04-2B063E0BE053}"/>
+                </a:ext>
+              </a:extLst>
+            </p:cNvPr>
+            <p:cNvCxnSpPr>
+              <a:cxnSpLocks/>
+            </p:cNvCxnSpPr>
+            <p:nvPr/>
+          </p:nvCxnSpPr>
+          <p:spPr>
+            <a:xfrm>
+              <a:off x="6330131" y="3979284"/>
+              <a:ext cx="719486" cy="0"/>
+            </a:xfrm>
+            <a:prstGeom prst="straightConnector1">
+              <a:avLst/>
+            </a:prstGeom>
+            <a:ln>
+              <a:tailEnd type="triangle"/>
+            </a:ln>
+          </p:spPr>
+          <p:style>
+            <a:lnRef idx="2">
+              <a:schemeClr val="accent1"/>
+            </a:lnRef>
+            <a:fillRef idx="0">
+              <a:schemeClr val="accent1"/>
+            </a:fillRef>
+            <a:effectRef idx="1">
+              <a:schemeClr val="accent1"/>
+            </a:effectRef>
+            <a:fontRef idx="minor">
+              <a:schemeClr val="tx1"/>
+            </a:fontRef>
+          </p:style>
+        </p:cxnSp>
+      </p:grpSp>
+    </p:spTree>
+    <p:extLst>
+      <p:ext uri="{BB962C8B-B14F-4D97-AF65-F5344CB8AC3E}">
+        <p14:creationId xmlns:p14="http://schemas.microsoft.com/office/powerpoint/2010/main" val="2248466130"/>
       </p:ext>
     </p:extLst>
   </p:cSld>

</xml_diff>